<commit_message>
updated code formatting and powerpoint presentation
</commit_message>
<xml_diff>
--- a/doc/RFinance Presentation.pptx
+++ b/doc/RFinance Presentation.pptx
@@ -7,10 +7,11 @@
   <p:sldIdLst>
     <p:sldId id="256" r:id="rId2"/>
     <p:sldId id="257" r:id="rId3"/>
-    <p:sldId id="258" r:id="rId4"/>
-    <p:sldId id="259" r:id="rId5"/>
-    <p:sldId id="260" r:id="rId6"/>
-    <p:sldId id="261" r:id="rId7"/>
+    <p:sldId id="262" r:id="rId4"/>
+    <p:sldId id="258" r:id="rId5"/>
+    <p:sldId id="263" r:id="rId6"/>
+    <p:sldId id="260" r:id="rId7"/>
+    <p:sldId id="261" r:id="rId8"/>
   </p:sldIdLst>
   <p:sldSz cx="12192000" cy="6858000"/>
   <p:notesSz cx="6858000" cy="9144000"/>
@@ -109,7 +110,403 @@
       </a:defRPr>
     </a:lvl9pPr>
   </p:defaultTextStyle>
+  <p:extLst>
+    <p:ext uri="{EFAFB233-063F-42B5-8137-9DF3F51BA10A}">
+      <p15:sldGuideLst xmlns:p15="http://schemas.microsoft.com/office/powerpoint/2012/main"/>
+    </p:ext>
+  </p:extLst>
 </p:presentation>
+</file>
+
+<file path=ppt/revisionInfo.xml><?xml version="1.0" encoding="utf-8"?>
+<p1510:revInfo xmlns:a="http://schemas.openxmlformats.org/drawingml/2006/main" xmlns:r="http://schemas.openxmlformats.org/officeDocument/2006/relationships" xmlns:p1510="http://schemas.microsoft.com/office/powerpoint/2015/10/main">
+  <p1510:revLst>
+    <p1510:client id="{646E94BB-F877-4F3D-9267-F961441CEC85}" v="1188" dt="2019-05-11T11:42:08.590"/>
+  </p1510:revLst>
+</p1510:revInfo>
+</file>
+
+<file path=ppt/changesInfos/changesInfo1.xml><?xml version="1.0" encoding="utf-8"?>
+<pc:chgInfo xmlns:a="http://schemas.openxmlformats.org/drawingml/2006/main" xmlns:r="http://schemas.openxmlformats.org/officeDocument/2006/relationships" xmlns:ac="http://schemas.microsoft.com/office/drawing/2013/main/command" xmlns:pc="http://schemas.microsoft.com/office/powerpoint/2013/main/command">
+  <pc:docChgLst>
+    <pc:chgData name="Joseph Loss" userId="5b31bea6-fbb6-46ce-a3c5-a099ce912c71" providerId="ADAL" clId="{646E94BB-F877-4F3D-9267-F961441CEC85}"/>
+    <pc:docChg chg="undo redo custSel addSld delSld modSld sldOrd">
+      <pc:chgData name="Joseph Loss" userId="5b31bea6-fbb6-46ce-a3c5-a099ce912c71" providerId="ADAL" clId="{646E94BB-F877-4F3D-9267-F961441CEC85}" dt="2019-05-11T12:47:58.792" v="2634" actId="208"/>
+      <pc:docMkLst>
+        <pc:docMk/>
+      </pc:docMkLst>
+      <pc:sldChg chg="addSp delSp modSp">
+        <pc:chgData name="Joseph Loss" userId="5b31bea6-fbb6-46ce-a3c5-a099ce912c71" providerId="ADAL" clId="{646E94BB-F877-4F3D-9267-F961441CEC85}" dt="2019-05-11T12:46:16.882" v="2552" actId="1035"/>
+        <pc:sldMkLst>
+          <pc:docMk/>
+          <pc:sldMk cId="3073640471" sldId="257"/>
+        </pc:sldMkLst>
+        <pc:spChg chg="mod">
+          <ac:chgData name="Joseph Loss" userId="5b31bea6-fbb6-46ce-a3c5-a099ce912c71" providerId="ADAL" clId="{646E94BB-F877-4F3D-9267-F961441CEC85}" dt="2019-05-11T11:59:40.240" v="1571" actId="20577"/>
+          <ac:spMkLst>
+            <pc:docMk/>
+            <pc:sldMk cId="3073640471" sldId="257"/>
+            <ac:spMk id="2" creationId="{B61AFE25-23F6-43CA-AA26-525D3710A26E}"/>
+          </ac:spMkLst>
+        </pc:spChg>
+        <pc:spChg chg="del">
+          <ac:chgData name="Joseph Loss" userId="5b31bea6-fbb6-46ce-a3c5-a099ce912c71" providerId="ADAL" clId="{646E94BB-F877-4F3D-9267-F961441CEC85}" dt="2019-05-11T11:06:21.415" v="0"/>
+          <ac:spMkLst>
+            <pc:docMk/>
+            <pc:sldMk cId="3073640471" sldId="257"/>
+            <ac:spMk id="3" creationId="{45408176-1C89-4B4B-8ABF-046EAADF5428}"/>
+          </ac:spMkLst>
+        </pc:spChg>
+        <pc:spChg chg="add mod">
+          <ac:chgData name="Joseph Loss" userId="5b31bea6-fbb6-46ce-a3c5-a099ce912c71" providerId="ADAL" clId="{646E94BB-F877-4F3D-9267-F961441CEC85}" dt="2019-05-11T12:45:57.559" v="2549" actId="208"/>
+          <ac:spMkLst>
+            <pc:docMk/>
+            <pc:sldMk cId="3073640471" sldId="257"/>
+            <ac:spMk id="4" creationId="{CA45D775-B129-46E4-998E-C6DD43F9C2A2}"/>
+          </ac:spMkLst>
+        </pc:spChg>
+        <pc:spChg chg="add mod">
+          <ac:chgData name="Joseph Loss" userId="5b31bea6-fbb6-46ce-a3c5-a099ce912c71" providerId="ADAL" clId="{646E94BB-F877-4F3D-9267-F961441CEC85}" dt="2019-05-11T12:46:16.882" v="2552" actId="1035"/>
+          <ac:spMkLst>
+            <pc:docMk/>
+            <pc:sldMk cId="3073640471" sldId="257"/>
+            <ac:spMk id="5" creationId="{88D7A6F8-7E42-4FDB-A361-EFA01B1B33C7}"/>
+          </ac:spMkLst>
+        </pc:spChg>
+        <pc:spChg chg="add mod">
+          <ac:chgData name="Joseph Loss" userId="5b31bea6-fbb6-46ce-a3c5-a099ce912c71" providerId="ADAL" clId="{646E94BB-F877-4F3D-9267-F961441CEC85}" dt="2019-05-11T12:45:04.345" v="2543" actId="403"/>
+          <ac:spMkLst>
+            <pc:docMk/>
+            <pc:sldMk cId="3073640471" sldId="257"/>
+            <ac:spMk id="6" creationId="{D5E5C886-B1DA-4B62-89F6-9A4C18DC36E3}"/>
+          </ac:spMkLst>
+        </pc:spChg>
+        <pc:spChg chg="add mod">
+          <ac:chgData name="Joseph Loss" userId="5b31bea6-fbb6-46ce-a3c5-a099ce912c71" providerId="ADAL" clId="{646E94BB-F877-4F3D-9267-F961441CEC85}" dt="2019-05-11T11:42:08.590" v="1510" actId="20577"/>
+          <ac:spMkLst>
+            <pc:docMk/>
+            <pc:sldMk cId="3073640471" sldId="257"/>
+            <ac:spMk id="7" creationId="{A6BB630E-A0CC-45EE-99A9-292DACBAA9AD}"/>
+          </ac:spMkLst>
+        </pc:spChg>
+        <pc:spChg chg="add mod">
+          <ac:chgData name="Joseph Loss" userId="5b31bea6-fbb6-46ce-a3c5-a099ce912c71" providerId="ADAL" clId="{646E94BB-F877-4F3D-9267-F961441CEC85}" dt="2019-05-11T11:46:06.220" v="1521" actId="20577"/>
+          <ac:spMkLst>
+            <pc:docMk/>
+            <pc:sldMk cId="3073640471" sldId="257"/>
+            <ac:spMk id="8" creationId="{57DFE35C-40CA-4FE9-964D-C054E6BFABC3}"/>
+          </ac:spMkLst>
+        </pc:spChg>
+        <pc:picChg chg="add del mod">
+          <ac:chgData name="Joseph Loss" userId="5b31bea6-fbb6-46ce-a3c5-a099ce912c71" providerId="ADAL" clId="{646E94BB-F877-4F3D-9267-F961441CEC85}" dt="2019-05-11T12:00:28.023" v="1575" actId="478"/>
+          <ac:picMkLst>
+            <pc:docMk/>
+            <pc:sldMk cId="3073640471" sldId="257"/>
+            <ac:picMk id="9" creationId="{B877F49C-E5D5-430D-A696-452DDD241995}"/>
+          </ac:picMkLst>
+        </pc:picChg>
+      </pc:sldChg>
+      <pc:sldChg chg="addSp delSp modSp ord">
+        <pc:chgData name="Joseph Loss" userId="5b31bea6-fbb6-46ce-a3c5-a099ce912c71" providerId="ADAL" clId="{646E94BB-F877-4F3D-9267-F961441CEC85}" dt="2019-05-11T12:47:58.792" v="2634" actId="208"/>
+        <pc:sldMkLst>
+          <pc:docMk/>
+          <pc:sldMk cId="4145850430" sldId="258"/>
+        </pc:sldMkLst>
+        <pc:spChg chg="mod">
+          <ac:chgData name="Joseph Loss" userId="5b31bea6-fbb6-46ce-a3c5-a099ce912c71" providerId="ADAL" clId="{646E94BB-F877-4F3D-9267-F961441CEC85}" dt="2019-05-11T11:53:48.731" v="1561" actId="20577"/>
+          <ac:spMkLst>
+            <pc:docMk/>
+            <pc:sldMk cId="4145850430" sldId="258"/>
+            <ac:spMk id="2" creationId="{31F05B1E-50EE-49B6-A2D4-3734C1688B30}"/>
+          </ac:spMkLst>
+        </pc:spChg>
+        <pc:spChg chg="del">
+          <ac:chgData name="Joseph Loss" userId="5b31bea6-fbb6-46ce-a3c5-a099ce912c71" providerId="ADAL" clId="{646E94BB-F877-4F3D-9267-F961441CEC85}" dt="2019-05-11T11:31:03.429" v="909"/>
+          <ac:spMkLst>
+            <pc:docMk/>
+            <pc:sldMk cId="4145850430" sldId="258"/>
+            <ac:spMk id="3" creationId="{19D5D9B4-FC20-4C37-AEF8-7265098D511C}"/>
+          </ac:spMkLst>
+        </pc:spChg>
+        <pc:spChg chg="add del mod">
+          <ac:chgData name="Joseph Loss" userId="5b31bea6-fbb6-46ce-a3c5-a099ce912c71" providerId="ADAL" clId="{646E94BB-F877-4F3D-9267-F961441CEC85}" dt="2019-05-11T12:47:03.002" v="2606" actId="478"/>
+          <ac:spMkLst>
+            <pc:docMk/>
+            <pc:sldMk cId="4145850430" sldId="258"/>
+            <ac:spMk id="4" creationId="{D22BF07F-008C-4F2E-B904-D8EAE72F75F0}"/>
+          </ac:spMkLst>
+        </pc:spChg>
+        <pc:spChg chg="add del mod">
+          <ac:chgData name="Joseph Loss" userId="5b31bea6-fbb6-46ce-a3c5-a099ce912c71" providerId="ADAL" clId="{646E94BB-F877-4F3D-9267-F961441CEC85}" dt="2019-05-11T11:47:51.119" v="1522" actId="931"/>
+          <ac:spMkLst>
+            <pc:docMk/>
+            <pc:sldMk cId="4145850430" sldId="258"/>
+            <ac:spMk id="5" creationId="{CE11FB81-0D37-43A7-90BB-8B38AC61B8E1}"/>
+          </ac:spMkLst>
+        </pc:spChg>
+        <pc:picChg chg="add mod">
+          <ac:chgData name="Joseph Loss" userId="5b31bea6-fbb6-46ce-a3c5-a099ce912c71" providerId="ADAL" clId="{646E94BB-F877-4F3D-9267-F961441CEC85}" dt="2019-05-11T12:47:58.792" v="2634" actId="208"/>
+          <ac:picMkLst>
+            <pc:docMk/>
+            <pc:sldMk cId="4145850430" sldId="258"/>
+            <ac:picMk id="8" creationId="{20D5A634-D357-478C-9594-31193CD3460F}"/>
+          </ac:picMkLst>
+        </pc:picChg>
+      </pc:sldChg>
+      <pc:sldChg chg="addSp delSp modSp del ord">
+        <pc:chgData name="Joseph Loss" userId="5b31bea6-fbb6-46ce-a3c5-a099ce912c71" providerId="ADAL" clId="{646E94BB-F877-4F3D-9267-F961441CEC85}" dt="2019-05-11T12:20:28.428" v="1844" actId="2696"/>
+        <pc:sldMkLst>
+          <pc:docMk/>
+          <pc:sldMk cId="627838685" sldId="259"/>
+        </pc:sldMkLst>
+        <pc:spChg chg="del">
+          <ac:chgData name="Joseph Loss" userId="5b31bea6-fbb6-46ce-a3c5-a099ce912c71" providerId="ADAL" clId="{646E94BB-F877-4F3D-9267-F961441CEC85}" dt="2019-05-11T11:31:14.780" v="910"/>
+          <ac:spMkLst>
+            <pc:docMk/>
+            <pc:sldMk cId="627838685" sldId="259"/>
+            <ac:spMk id="3" creationId="{9F9825DC-7AC1-46E9-B5D1-E85E0F695787}"/>
+          </ac:spMkLst>
+        </pc:spChg>
+        <pc:spChg chg="add mod">
+          <ac:chgData name="Joseph Loss" userId="5b31bea6-fbb6-46ce-a3c5-a099ce912c71" providerId="ADAL" clId="{646E94BB-F877-4F3D-9267-F961441CEC85}" dt="2019-05-11T11:31:14.780" v="910"/>
+          <ac:spMkLst>
+            <pc:docMk/>
+            <pc:sldMk cId="627838685" sldId="259"/>
+            <ac:spMk id="4" creationId="{BBDDABDC-A3F2-4B30-B65F-3D5B77B6191F}"/>
+          </ac:spMkLst>
+        </pc:spChg>
+        <pc:spChg chg="add del mod">
+          <ac:chgData name="Joseph Loss" userId="5b31bea6-fbb6-46ce-a3c5-a099ce912c71" providerId="ADAL" clId="{646E94BB-F877-4F3D-9267-F961441CEC85}" dt="2019-05-11T11:54:09.591" v="1562" actId="478"/>
+          <ac:spMkLst>
+            <pc:docMk/>
+            <pc:sldMk cId="627838685" sldId="259"/>
+            <ac:spMk id="5" creationId="{14C3A0A3-AC70-43B9-9F02-86342A5F1C62}"/>
+          </ac:spMkLst>
+        </pc:spChg>
+      </pc:sldChg>
+      <pc:sldChg chg="modSp">
+        <pc:chgData name="Joseph Loss" userId="5b31bea6-fbb6-46ce-a3c5-a099ce912c71" providerId="ADAL" clId="{646E94BB-F877-4F3D-9267-F961441CEC85}" dt="2019-05-11T11:31:33.452" v="965" actId="20577"/>
+        <pc:sldMkLst>
+          <pc:docMk/>
+          <pc:sldMk cId="3198049024" sldId="260"/>
+        </pc:sldMkLst>
+        <pc:spChg chg="mod">
+          <ac:chgData name="Joseph Loss" userId="5b31bea6-fbb6-46ce-a3c5-a099ce912c71" providerId="ADAL" clId="{646E94BB-F877-4F3D-9267-F961441CEC85}" dt="2019-05-11T11:31:33.452" v="965" actId="20577"/>
+          <ac:spMkLst>
+            <pc:docMk/>
+            <pc:sldMk cId="3198049024" sldId="260"/>
+            <ac:spMk id="2" creationId="{961C48E0-30D0-4735-B980-D5848818C893}"/>
+          </ac:spMkLst>
+        </pc:spChg>
+      </pc:sldChg>
+      <pc:sldChg chg="addSp delSp modSp">
+        <pc:chgData name="Joseph Loss" userId="5b31bea6-fbb6-46ce-a3c5-a099ce912c71" providerId="ADAL" clId="{646E94BB-F877-4F3D-9267-F961441CEC85}" dt="2019-05-11T12:44:28.333" v="2537" actId="1038"/>
+        <pc:sldMkLst>
+          <pc:docMk/>
+          <pc:sldMk cId="267837838" sldId="261"/>
+        </pc:sldMkLst>
+        <pc:spChg chg="mod">
+          <ac:chgData name="Joseph Loss" userId="5b31bea6-fbb6-46ce-a3c5-a099ce912c71" providerId="ADAL" clId="{646E94BB-F877-4F3D-9267-F961441CEC85}" dt="2019-05-11T12:39:53.831" v="2293" actId="1076"/>
+          <ac:spMkLst>
+            <pc:docMk/>
+            <pc:sldMk cId="267837838" sldId="261"/>
+            <ac:spMk id="3" creationId="{9E905BB4-1542-4F15-999F-44032E540457}"/>
+          </ac:spMkLst>
+        </pc:spChg>
+        <pc:spChg chg="add del mod">
+          <ac:chgData name="Joseph Loss" userId="5b31bea6-fbb6-46ce-a3c5-a099ce912c71" providerId="ADAL" clId="{646E94BB-F877-4F3D-9267-F961441CEC85}" dt="2019-05-11T12:34:01.997" v="2215" actId="478"/>
+          <ac:spMkLst>
+            <pc:docMk/>
+            <pc:sldMk cId="267837838" sldId="261"/>
+            <ac:spMk id="4" creationId="{F1CA9B1A-8E07-4E3D-AACB-CFB8E522DDB8}"/>
+          </ac:spMkLst>
+        </pc:spChg>
+        <pc:spChg chg="add del mod">
+          <ac:chgData name="Joseph Loss" userId="5b31bea6-fbb6-46ce-a3c5-a099ce912c71" providerId="ADAL" clId="{646E94BB-F877-4F3D-9267-F961441CEC85}" dt="2019-05-11T12:38:18.815" v="2280" actId="478"/>
+          <ac:spMkLst>
+            <pc:docMk/>
+            <pc:sldMk cId="267837838" sldId="261"/>
+            <ac:spMk id="5" creationId="{71E174FB-87FF-43FF-830E-A582E7E32642}"/>
+          </ac:spMkLst>
+        </pc:spChg>
+        <pc:spChg chg="add mod">
+          <ac:chgData name="Joseph Loss" userId="5b31bea6-fbb6-46ce-a3c5-a099ce912c71" providerId="ADAL" clId="{646E94BB-F877-4F3D-9267-F961441CEC85}" dt="2019-05-11T12:44:28.333" v="2537" actId="1038"/>
+          <ac:spMkLst>
+            <pc:docMk/>
+            <pc:sldMk cId="267837838" sldId="261"/>
+            <ac:spMk id="12" creationId="{D8CF9A3B-890F-41FB-9E67-A275F13E2BF8}"/>
+          </ac:spMkLst>
+        </pc:spChg>
+        <pc:spChg chg="add del mod">
+          <ac:chgData name="Joseph Loss" userId="5b31bea6-fbb6-46ce-a3c5-a099ce912c71" providerId="ADAL" clId="{646E94BB-F877-4F3D-9267-F961441CEC85}" dt="2019-05-11T12:38:22.729" v="2281" actId="478"/>
+          <ac:spMkLst>
+            <pc:docMk/>
+            <pc:sldMk cId="267837838" sldId="261"/>
+            <ac:spMk id="14" creationId="{BD819398-1BF9-42AB-96A0-B90B2F50CF07}"/>
+          </ac:spMkLst>
+        </pc:spChg>
+        <pc:spChg chg="add mod">
+          <ac:chgData name="Joseph Loss" userId="5b31bea6-fbb6-46ce-a3c5-a099ce912c71" providerId="ADAL" clId="{646E94BB-F877-4F3D-9267-F961441CEC85}" dt="2019-05-11T12:44:15.339" v="2535" actId="1038"/>
+          <ac:spMkLst>
+            <pc:docMk/>
+            <pc:sldMk cId="267837838" sldId="261"/>
+            <ac:spMk id="16" creationId="{2F4AA7CC-6D21-45BA-9761-D542B893B95F}"/>
+          </ac:spMkLst>
+        </pc:spChg>
+        <pc:picChg chg="add mod">
+          <ac:chgData name="Joseph Loss" userId="5b31bea6-fbb6-46ce-a3c5-a099ce912c71" providerId="ADAL" clId="{646E94BB-F877-4F3D-9267-F961441CEC85}" dt="2019-05-11T12:44:28.333" v="2537" actId="1038"/>
+          <ac:picMkLst>
+            <pc:docMk/>
+            <pc:sldMk cId="267837838" sldId="261"/>
+            <ac:picMk id="7" creationId="{1FA7A8A6-DE19-4FB6-ACFB-79F8CDFBFD61}"/>
+          </ac:picMkLst>
+        </pc:picChg>
+        <pc:picChg chg="add del mod">
+          <ac:chgData name="Joseph Loss" userId="5b31bea6-fbb6-46ce-a3c5-a099ce912c71" providerId="ADAL" clId="{646E94BB-F877-4F3D-9267-F961441CEC85}" dt="2019-05-11T12:30:16.238" v="1942" actId="478"/>
+          <ac:picMkLst>
+            <pc:docMk/>
+            <pc:sldMk cId="267837838" sldId="261"/>
+            <ac:picMk id="9" creationId="{E000DAF4-C843-497E-B3F6-32CD2AFD4C0D}"/>
+          </ac:picMkLst>
+        </pc:picChg>
+        <pc:picChg chg="add mod">
+          <ac:chgData name="Joseph Loss" userId="5b31bea6-fbb6-46ce-a3c5-a099ce912c71" providerId="ADAL" clId="{646E94BB-F877-4F3D-9267-F961441CEC85}" dt="2019-05-11T12:39:26.145" v="2291" actId="408"/>
+          <ac:picMkLst>
+            <pc:docMk/>
+            <pc:sldMk cId="267837838" sldId="261"/>
+            <ac:picMk id="11" creationId="{1F1FF6BB-6A08-4C26-BCDA-0B4BAE6EDE72}"/>
+          </ac:picMkLst>
+        </pc:picChg>
+        <pc:picChg chg="add del mod">
+          <ac:chgData name="Joseph Loss" userId="5b31bea6-fbb6-46ce-a3c5-a099ce912c71" providerId="ADAL" clId="{646E94BB-F877-4F3D-9267-F961441CEC85}" dt="2019-05-11T12:38:22.729" v="2281" actId="478"/>
+          <ac:picMkLst>
+            <pc:docMk/>
+            <pc:sldMk cId="267837838" sldId="261"/>
+            <ac:picMk id="13" creationId="{71CBD972-2A42-447E-8034-94617C816ED2}"/>
+          </ac:picMkLst>
+        </pc:picChg>
+        <pc:picChg chg="add mod">
+          <ac:chgData name="Joseph Loss" userId="5b31bea6-fbb6-46ce-a3c5-a099ce912c71" providerId="ADAL" clId="{646E94BB-F877-4F3D-9267-F961441CEC85}" dt="2019-05-11T12:44:15.339" v="2535" actId="1038"/>
+          <ac:picMkLst>
+            <pc:docMk/>
+            <pc:sldMk cId="267837838" sldId="261"/>
+            <ac:picMk id="15" creationId="{4B9EB5CB-62CB-4DB4-90EA-7D604CB8D6C4}"/>
+          </ac:picMkLst>
+        </pc:picChg>
+      </pc:sldChg>
+      <pc:sldChg chg="addSp delSp modSp add">
+        <pc:chgData name="Joseph Loss" userId="5b31bea6-fbb6-46ce-a3c5-a099ce912c71" providerId="ADAL" clId="{646E94BB-F877-4F3D-9267-F961441CEC85}" dt="2019-05-11T12:47:56.936" v="2632" actId="1035"/>
+        <pc:sldMkLst>
+          <pc:docMk/>
+          <pc:sldMk cId="1418679565" sldId="262"/>
+        </pc:sldMkLst>
+        <pc:spChg chg="mod">
+          <ac:chgData name="Joseph Loss" userId="5b31bea6-fbb6-46ce-a3c5-a099ce912c71" providerId="ADAL" clId="{646E94BB-F877-4F3D-9267-F961441CEC85}" dt="2019-05-11T12:47:56.936" v="2632" actId="1035"/>
+          <ac:spMkLst>
+            <pc:docMk/>
+            <pc:sldMk cId="1418679565" sldId="262"/>
+            <ac:spMk id="2" creationId="{31F05B1E-50EE-49B6-A2D4-3734C1688B30}"/>
+          </ac:spMkLst>
+        </pc:spChg>
+        <pc:spChg chg="del">
+          <ac:chgData name="Joseph Loss" userId="5b31bea6-fbb6-46ce-a3c5-a099ce912c71" providerId="ADAL" clId="{646E94BB-F877-4F3D-9267-F961441CEC85}" dt="2019-05-11T11:50:39.797" v="1533"/>
+          <ac:spMkLst>
+            <pc:docMk/>
+            <pc:sldMk cId="1418679565" sldId="262"/>
+            <ac:spMk id="4" creationId="{D22BF07F-008C-4F2E-B904-D8EAE72F75F0}"/>
+          </ac:spMkLst>
+        </pc:spChg>
+        <pc:spChg chg="add del mod">
+          <ac:chgData name="Joseph Loss" userId="5b31bea6-fbb6-46ce-a3c5-a099ce912c71" providerId="ADAL" clId="{646E94BB-F877-4F3D-9267-F961441CEC85}" dt="2019-05-11T11:50:39.797" v="1533"/>
+          <ac:spMkLst>
+            <pc:docMk/>
+            <pc:sldMk cId="1418679565" sldId="262"/>
+            <ac:spMk id="5" creationId="{AD4B3D57-90E1-421F-97CD-3EC4E58D9DDE}"/>
+          </ac:spMkLst>
+        </pc:spChg>
+        <pc:spChg chg="add del mod">
+          <ac:chgData name="Joseph Loss" userId="5b31bea6-fbb6-46ce-a3c5-a099ce912c71" providerId="ADAL" clId="{646E94BB-F877-4F3D-9267-F961441CEC85}" dt="2019-05-11T11:52:17.044" v="1534"/>
+          <ac:spMkLst>
+            <pc:docMk/>
+            <pc:sldMk cId="1418679565" sldId="262"/>
+            <ac:spMk id="6" creationId="{7C6AB42B-58D3-4421-9A09-CDF65F04C52D}"/>
+          </ac:spMkLst>
+        </pc:spChg>
+        <pc:picChg chg="add mod">
+          <ac:chgData name="Joseph Loss" userId="5b31bea6-fbb6-46ce-a3c5-a099ce912c71" providerId="ADAL" clId="{646E94BB-F877-4F3D-9267-F961441CEC85}" dt="2019-05-11T12:25:26.996" v="1874" actId="14100"/>
+          <ac:picMkLst>
+            <pc:docMk/>
+            <pc:sldMk cId="1418679565" sldId="262"/>
+            <ac:picMk id="7" creationId="{92BA781D-8E2A-4767-8F94-87E6F22C7A99}"/>
+          </ac:picMkLst>
+        </pc:picChg>
+        <pc:picChg chg="del">
+          <ac:chgData name="Joseph Loss" userId="5b31bea6-fbb6-46ce-a3c5-a099ce912c71" providerId="ADAL" clId="{646E94BB-F877-4F3D-9267-F961441CEC85}" dt="2019-05-11T11:50:33.027" v="1532" actId="478"/>
+          <ac:picMkLst>
+            <pc:docMk/>
+            <pc:sldMk cId="1418679565" sldId="262"/>
+            <ac:picMk id="8" creationId="{20D5A634-D357-478C-9594-31193CD3460F}"/>
+          </ac:picMkLst>
+        </pc:picChg>
+      </pc:sldChg>
+      <pc:sldChg chg="addSp delSp modSp add ord">
+        <pc:chgData name="Joseph Loss" userId="5b31bea6-fbb6-46ce-a3c5-a099ce912c71" providerId="ADAL" clId="{646E94BB-F877-4F3D-9267-F961441CEC85}" dt="2019-05-11T12:28:02.538" v="1930" actId="1036"/>
+        <pc:sldMkLst>
+          <pc:docMk/>
+          <pc:sldMk cId="2599024257" sldId="263"/>
+        </pc:sldMkLst>
+        <pc:spChg chg="mod">
+          <ac:chgData name="Joseph Loss" userId="5b31bea6-fbb6-46ce-a3c5-a099ce912c71" providerId="ADAL" clId="{646E94BB-F877-4F3D-9267-F961441CEC85}" dt="2019-05-11T12:08:24.920" v="1645" actId="20577"/>
+          <ac:spMkLst>
+            <pc:docMk/>
+            <pc:sldMk cId="2599024257" sldId="263"/>
+            <ac:spMk id="2" creationId="{31F05B1E-50EE-49B6-A2D4-3734C1688B30}"/>
+          </ac:spMkLst>
+        </pc:spChg>
+        <pc:spChg chg="add del mod">
+          <ac:chgData name="Joseph Loss" userId="5b31bea6-fbb6-46ce-a3c5-a099ce912c71" providerId="ADAL" clId="{646E94BB-F877-4F3D-9267-F961441CEC85}" dt="2019-05-11T12:25:52.235" v="1878" actId="478"/>
+          <ac:spMkLst>
+            <pc:docMk/>
+            <pc:sldMk cId="2599024257" sldId="263"/>
+            <ac:spMk id="6" creationId="{8255EC6B-1586-4BE2-8751-FB988F45E42A}"/>
+          </ac:spMkLst>
+        </pc:spChg>
+        <pc:picChg chg="add del mod">
+          <ac:chgData name="Joseph Loss" userId="5b31bea6-fbb6-46ce-a3c5-a099ce912c71" providerId="ADAL" clId="{646E94BB-F877-4F3D-9267-F961441CEC85}" dt="2019-05-11T12:25:04.081" v="1852" actId="478"/>
+          <ac:picMkLst>
+            <pc:docMk/>
+            <pc:sldMk cId="2599024257" sldId="263"/>
+            <ac:picMk id="3" creationId="{AA519EEF-B73F-4D20-ACDF-AB5C43440FB8}"/>
+          </ac:picMkLst>
+        </pc:picChg>
+        <pc:picChg chg="add del mod">
+          <ac:chgData name="Joseph Loss" userId="5b31bea6-fbb6-46ce-a3c5-a099ce912c71" providerId="ADAL" clId="{646E94BB-F877-4F3D-9267-F961441CEC85}" dt="2019-05-11T12:25:53.799" v="1879" actId="478"/>
+          <ac:picMkLst>
+            <pc:docMk/>
+            <pc:sldMk cId="2599024257" sldId="263"/>
+            <ac:picMk id="4" creationId="{57609292-6B59-41A9-827B-E98D45A13DC1}"/>
+          </ac:picMkLst>
+        </pc:picChg>
+        <pc:picChg chg="del">
+          <ac:chgData name="Joseph Loss" userId="5b31bea6-fbb6-46ce-a3c5-a099ce912c71" providerId="ADAL" clId="{646E94BB-F877-4F3D-9267-F961441CEC85}" dt="2019-05-11T12:25:43.259" v="1876" actId="478"/>
+          <ac:picMkLst>
+            <pc:docMk/>
+            <pc:sldMk cId="2599024257" sldId="263"/>
+            <ac:picMk id="7" creationId="{92BA781D-8E2A-4767-8F94-87E6F22C7A99}"/>
+          </ac:picMkLst>
+        </pc:picChg>
+        <pc:picChg chg="add mod">
+          <ac:chgData name="Joseph Loss" userId="5b31bea6-fbb6-46ce-a3c5-a099ce912c71" providerId="ADAL" clId="{646E94BB-F877-4F3D-9267-F961441CEC85}" dt="2019-05-11T12:28:02.538" v="1930" actId="1036"/>
+          <ac:picMkLst>
+            <pc:docMk/>
+            <pc:sldMk cId="2599024257" sldId="263"/>
+            <ac:picMk id="8" creationId="{3EF231DE-180C-42FA-8CA0-1D7ED42576B5}"/>
+          </ac:picMkLst>
+        </pc:picChg>
+      </pc:sldChg>
+    </pc:docChg>
+  </pc:docChgLst>
+</pc:chgInfo>
 </file>
 
 <file path=ppt/slideLayouts/slideLayout1.xml><?xml version="1.0" encoding="utf-8"?>
@@ -3888,24 +4285,31 @@
             <p:ph type="title"/>
           </p:nvPr>
         </p:nvSpPr>
-        <p:spPr/>
-        <p:txBody>
-          <a:bodyPr/>
+        <p:spPr>
+          <a:xfrm>
+            <a:off x="1097279" y="286603"/>
+            <a:ext cx="10387409" cy="1450757"/>
+          </a:xfrm>
+        </p:spPr>
+        <p:txBody>
+          <a:bodyPr>
+            <a:normAutofit/>
+          </a:bodyPr>
           <a:lstStyle/>
           <a:p>
             <a:r>
-              <a:rPr lang="en-US" dirty="0"/>
-              <a:t>Background</a:t>
-            </a:r>
-          </a:p>
-        </p:txBody>
-      </p:sp>
-      <p:sp>
-        <p:nvSpPr>
-          <p:cNvPr id="3" name="Content Placeholder 2">
+              <a:rPr lang="en-US" sz="4700" dirty="0"/>
+              <a:t>Background: European Vanilla Put Options</a:t>
+            </a:r>
+          </a:p>
+        </p:txBody>
+      </p:sp>
+      <p:sp>
+        <p:nvSpPr>
+          <p:cNvPr id="4" name="Text Placeholder 3">
             <a:extLst>
               <a:ext uri="{FF2B5EF4-FFF2-40B4-BE49-F238E27FC236}">
-                <a16:creationId xmlns:a16="http://schemas.microsoft.com/office/drawing/2014/main" id="{45408176-1C89-4B4B-8ABF-046EAADF5428}"/>
+                <a16:creationId xmlns:a16="http://schemas.microsoft.com/office/drawing/2014/main" id="{CA45D775-B129-46E4-998E-C6DD43F9C2A2}"/>
               </a:ext>
             </a:extLst>
           </p:cNvPr>
@@ -3913,15 +4317,1091 @@
             <a:spLocks noGrp="1"/>
           </p:cNvSpPr>
           <p:nvPr>
-            <p:ph idx="1"/>
-          </p:nvPr>
-        </p:nvSpPr>
-        <p:spPr/>
+            <p:ph type="body" idx="1"/>
+          </p:nvPr>
+        </p:nvSpPr>
+        <p:spPr>
+          <a:xfrm>
+            <a:off x="1097280" y="1846052"/>
+            <a:ext cx="4937760" cy="736282"/>
+          </a:xfrm>
+        </p:spPr>
         <p:txBody>
           <a:bodyPr/>
           <a:lstStyle/>
           <a:p>
-            <a:endParaRPr lang="en-US"/>
+            <a:r>
+              <a:rPr lang="en-US" dirty="0"/>
+              <a:t>Normal Inverse Gaussian algorithm</a:t>
+            </a:r>
+          </a:p>
+        </p:txBody>
+      </p:sp>
+      <mc:AlternateContent xmlns:mc="http://schemas.openxmlformats.org/markup-compatibility/2006">
+        <mc:Choice xmlns:a14="http://schemas.microsoft.com/office/drawing/2010/main" Requires="a14">
+          <p:sp>
+            <p:nvSpPr>
+              <p:cNvPr id="5" name="Content Placeholder 4">
+                <a:extLst>
+                  <a:ext uri="{FF2B5EF4-FFF2-40B4-BE49-F238E27FC236}">
+                    <a16:creationId xmlns:a16="http://schemas.microsoft.com/office/drawing/2014/main" id="{88D7A6F8-7E42-4FDB-A361-EFA01B1B33C7}"/>
+                  </a:ext>
+                </a:extLst>
+              </p:cNvPr>
+              <p:cNvSpPr>
+                <a:spLocks noGrp="1"/>
+              </p:cNvSpPr>
+              <p:nvPr>
+                <p:ph sz="half" idx="2"/>
+              </p:nvPr>
+            </p:nvSpPr>
+            <p:spPr>
+              <a:xfrm>
+                <a:off x="1097280" y="2577717"/>
+                <a:ext cx="4937760" cy="3286760"/>
+              </a:xfrm>
+            </p:spPr>
+            <p:txBody>
+              <a:bodyPr/>
+              <a:lstStyle/>
+              <a:p>
+                <a14:m>
+                  <m:oMath xmlns:m="http://schemas.openxmlformats.org/officeDocument/2006/math">
+                    <m:sSub>
+                      <m:sSubPr>
+                        <m:ctrlPr>
+                          <a:rPr lang="en-US" sz="2400" b="0" i="1" smtClean="0">
+                            <a:latin typeface="Cambria Math" panose="02040503050406030204" pitchFamily="18" charset="0"/>
+                          </a:rPr>
+                        </m:ctrlPr>
+                      </m:sSubPr>
+                      <m:e>
+                        <m:r>
+                          <a:rPr lang="en-US" sz="2400" b="0" i="1" smtClean="0">
+                            <a:latin typeface="Cambria Math" panose="02040503050406030204" pitchFamily="18" charset="0"/>
+                          </a:rPr>
+                          <m:t>𝑆</m:t>
+                        </m:r>
+                      </m:e>
+                      <m:sub>
+                        <m:r>
+                          <a:rPr lang="en-US" sz="2400" b="0" i="1" smtClean="0">
+                            <a:latin typeface="Cambria Math" panose="02040503050406030204" pitchFamily="18" charset="0"/>
+                          </a:rPr>
+                          <m:t>𝑇</m:t>
+                        </m:r>
+                      </m:sub>
+                    </m:sSub>
+                    <m:r>
+                      <a:rPr lang="en-US" sz="2400" b="0" i="1" smtClean="0">
+                        <a:latin typeface="Cambria Math" panose="02040503050406030204" pitchFamily="18" charset="0"/>
+                      </a:rPr>
+                      <m:t>=</m:t>
+                    </m:r>
+                    <m:sSub>
+                      <m:sSubPr>
+                        <m:ctrlPr>
+                          <a:rPr lang="en-US" sz="2400" b="0" i="1" smtClean="0">
+                            <a:latin typeface="Cambria Math" panose="02040503050406030204" pitchFamily="18" charset="0"/>
+                          </a:rPr>
+                        </m:ctrlPr>
+                      </m:sSubPr>
+                      <m:e>
+                        <m:r>
+                          <a:rPr lang="en-US" sz="2400" b="0" i="1" smtClean="0">
+                            <a:latin typeface="Cambria Math" panose="02040503050406030204" pitchFamily="18" charset="0"/>
+                          </a:rPr>
+                          <m:t>𝑆</m:t>
+                        </m:r>
+                      </m:e>
+                      <m:sub>
+                        <m:r>
+                          <a:rPr lang="en-US" sz="2400" b="0" i="1" smtClean="0">
+                            <a:latin typeface="Cambria Math" panose="02040503050406030204" pitchFamily="18" charset="0"/>
+                          </a:rPr>
+                          <m:t>0</m:t>
+                        </m:r>
+                      </m:sub>
+                    </m:sSub>
+                    <m:r>
+                      <a:rPr lang="en-US" sz="2400" b="0" i="1" smtClean="0">
+                        <a:latin typeface="Cambria Math" panose="02040503050406030204" pitchFamily="18" charset="0"/>
+                      </a:rPr>
+                      <m:t>∗</m:t>
+                    </m:r>
+                    <m:sSup>
+                      <m:sSupPr>
+                        <m:ctrlPr>
+                          <a:rPr lang="en-US" sz="2400" b="0" i="1" smtClean="0">
+                            <a:latin typeface="Cambria Math" panose="02040503050406030204" pitchFamily="18" charset="0"/>
+                          </a:rPr>
+                        </m:ctrlPr>
+                      </m:sSupPr>
+                      <m:e>
+                        <m:r>
+                          <a:rPr lang="en-US" sz="2400" b="0" i="1" smtClean="0">
+                            <a:latin typeface="Cambria Math" panose="02040503050406030204" pitchFamily="18" charset="0"/>
+                          </a:rPr>
+                          <m:t>𝑒</m:t>
+                        </m:r>
+                      </m:e>
+                      <m:sup>
+                        <m:sSub>
+                          <m:sSubPr>
+                            <m:ctrlPr>
+                              <a:rPr lang="en-US" sz="2400" b="0" i="1" smtClean="0">
+                                <a:latin typeface="Cambria Math" panose="02040503050406030204" pitchFamily="18" charset="0"/>
+                              </a:rPr>
+                            </m:ctrlPr>
+                          </m:sSubPr>
+                          <m:e>
+                            <m:r>
+                              <a:rPr lang="en-US" sz="2400" b="0" i="1" smtClean="0">
+                                <a:latin typeface="Cambria Math" panose="02040503050406030204" pitchFamily="18" charset="0"/>
+                              </a:rPr>
+                              <m:t>𝑋</m:t>
+                            </m:r>
+                          </m:e>
+                          <m:sub>
+                            <m:r>
+                              <a:rPr lang="en-US" sz="2400" b="0" i="1" smtClean="0">
+                                <a:latin typeface="Cambria Math" panose="02040503050406030204" pitchFamily="18" charset="0"/>
+                              </a:rPr>
+                              <m:t>𝑇</m:t>
+                            </m:r>
+                          </m:sub>
+                        </m:sSub>
+                      </m:sup>
+                    </m:sSup>
+                  </m:oMath>
+                </a14:m>
+                <a:endParaRPr lang="en-US" b="0" dirty="0"/>
+              </a:p>
+              <a:p>
+                <a:pPr indent="-182880">
+                  <a:buFont typeface="Arial" panose="020B0604020202020204" pitchFamily="34" charset="0"/>
+                  <a:buChar char="•"/>
+                </a:pPr>
+                <a:r>
+                  <a:rPr lang="en-US" dirty="0">
+                    <a:cs typeface="Arial" panose="020B0604020202020204" pitchFamily="34" charset="0"/>
+                  </a:rPr>
+                  <a:t>NIG process is simulated through a Brownian subordination </a:t>
+                </a:r>
+              </a:p>
+              <a:p>
+                <a:pPr indent="-182880">
+                  <a:buFont typeface="Arial" panose="020B0604020202020204" pitchFamily="34" charset="0"/>
+                  <a:buChar char="•"/>
+                </a:pPr>
+                <a14:m>
+                  <m:oMath xmlns:m="http://schemas.openxmlformats.org/officeDocument/2006/math">
+                    <m:sSub>
+                      <m:sSubPr>
+                        <m:ctrlPr>
+                          <a:rPr lang="en-US" b="0" i="1" smtClean="0">
+                            <a:latin typeface="Cambria Math" panose="02040503050406030204" pitchFamily="18" charset="0"/>
+                            <a:cs typeface="Arial" panose="020B0604020202020204" pitchFamily="34" charset="0"/>
+                          </a:rPr>
+                        </m:ctrlPr>
+                      </m:sSubPr>
+                      <m:e>
+                        <m:r>
+                          <a:rPr lang="en-US" b="0" i="1" smtClean="0">
+                            <a:latin typeface="Cambria Math" panose="02040503050406030204" pitchFamily="18" charset="0"/>
+                            <a:cs typeface="Arial" panose="020B0604020202020204" pitchFamily="34" charset="0"/>
+                          </a:rPr>
+                          <m:t>𝑋</m:t>
+                        </m:r>
+                      </m:e>
+                      <m:sub>
+                        <m:r>
+                          <a:rPr lang="en-US" b="0" i="1" smtClean="0">
+                            <a:latin typeface="Cambria Math" panose="02040503050406030204" pitchFamily="18" charset="0"/>
+                            <a:cs typeface="Arial" panose="020B0604020202020204" pitchFamily="34" charset="0"/>
+                          </a:rPr>
+                          <m:t>𝑡</m:t>
+                        </m:r>
+                      </m:sub>
+                    </m:sSub>
+                    <m:r>
+                      <a:rPr lang="en-US" b="0" i="0" smtClean="0">
+                        <a:latin typeface="Cambria Math" panose="02040503050406030204" pitchFamily="18" charset="0"/>
+                        <a:cs typeface="Arial" panose="020B0604020202020204" pitchFamily="34" charset="0"/>
+                      </a:rPr>
+                      <m:t>=</m:t>
+                    </m:r>
+                    <m:r>
+                      <a:rPr lang="en-US" b="0" i="1" smtClean="0">
+                        <a:latin typeface="Cambria Math" panose="02040503050406030204" pitchFamily="18" charset="0"/>
+                        <a:cs typeface="Arial" panose="020B0604020202020204" pitchFamily="34" charset="0"/>
+                      </a:rPr>
+                      <m:t>𝜇</m:t>
+                    </m:r>
+                    <m:r>
+                      <a:rPr lang="en-US" b="0" i="1" smtClean="0">
+                        <a:latin typeface="Cambria Math" panose="02040503050406030204" pitchFamily="18" charset="0"/>
+                        <a:cs typeface="Arial" panose="020B0604020202020204" pitchFamily="34" charset="0"/>
+                      </a:rPr>
+                      <m:t>𝑡</m:t>
+                    </m:r>
+                    <m:r>
+                      <a:rPr lang="en-US" b="0" i="1" smtClean="0">
+                        <a:latin typeface="Cambria Math" panose="02040503050406030204" pitchFamily="18" charset="0"/>
+                        <a:cs typeface="Arial" panose="020B0604020202020204" pitchFamily="34" charset="0"/>
+                      </a:rPr>
+                      <m:t>+</m:t>
+                    </m:r>
+                    <m:r>
+                      <a:rPr lang="en-US" b="0" i="1" smtClean="0">
+                        <a:latin typeface="Cambria Math" panose="02040503050406030204" pitchFamily="18" charset="0"/>
+                        <a:cs typeface="Arial" panose="020B0604020202020204" pitchFamily="34" charset="0"/>
+                      </a:rPr>
+                      <m:t>𝛽</m:t>
+                    </m:r>
+                    <m:sSub>
+                      <m:sSubPr>
+                        <m:ctrlPr>
+                          <a:rPr lang="en-US" b="0" i="1" smtClean="0">
+                            <a:latin typeface="Cambria Math" panose="02040503050406030204" pitchFamily="18" charset="0"/>
+                            <a:cs typeface="Arial" panose="020B0604020202020204" pitchFamily="34" charset="0"/>
+                          </a:rPr>
+                        </m:ctrlPr>
+                      </m:sSubPr>
+                      <m:e>
+                        <m:r>
+                          <a:rPr lang="en-US" b="0" i="1" smtClean="0">
+                            <a:latin typeface="Cambria Math" panose="02040503050406030204" pitchFamily="18" charset="0"/>
+                            <a:cs typeface="Arial" panose="020B0604020202020204" pitchFamily="34" charset="0"/>
+                          </a:rPr>
+                          <m:t>𝑧</m:t>
+                        </m:r>
+                      </m:e>
+                      <m:sub>
+                        <m:r>
+                          <a:rPr lang="en-US" b="0" i="1" smtClean="0">
+                            <a:latin typeface="Cambria Math" panose="02040503050406030204" pitchFamily="18" charset="0"/>
+                            <a:cs typeface="Arial" panose="020B0604020202020204" pitchFamily="34" charset="0"/>
+                          </a:rPr>
+                          <m:t>𝑡</m:t>
+                        </m:r>
+                      </m:sub>
+                    </m:sSub>
+                    <m:r>
+                      <a:rPr lang="en-US" b="0" i="1" smtClean="0">
+                        <a:latin typeface="Cambria Math" panose="02040503050406030204" pitchFamily="18" charset="0"/>
+                        <a:cs typeface="Arial" panose="020B0604020202020204" pitchFamily="34" charset="0"/>
+                      </a:rPr>
+                      <m:t>+</m:t>
+                    </m:r>
+                    <m:rad>
+                      <m:radPr>
+                        <m:degHide m:val="on"/>
+                        <m:ctrlPr>
+                          <a:rPr lang="en-US" b="0" i="1" smtClean="0">
+                            <a:latin typeface="Cambria Math" panose="02040503050406030204" pitchFamily="18" charset="0"/>
+                            <a:cs typeface="Arial" panose="020B0604020202020204" pitchFamily="34" charset="0"/>
+                          </a:rPr>
+                        </m:ctrlPr>
+                      </m:radPr>
+                      <m:deg/>
+                      <m:e>
+                        <m:sSub>
+                          <m:sSubPr>
+                            <m:ctrlPr>
+                              <a:rPr lang="en-US" b="0" i="1" smtClean="0">
+                                <a:latin typeface="Cambria Math" panose="02040503050406030204" pitchFamily="18" charset="0"/>
+                                <a:cs typeface="Arial" panose="020B0604020202020204" pitchFamily="34" charset="0"/>
+                              </a:rPr>
+                            </m:ctrlPr>
+                          </m:sSubPr>
+                          <m:e>
+                            <m:r>
+                              <a:rPr lang="en-US" b="0" i="1" smtClean="0">
+                                <a:latin typeface="Cambria Math" panose="02040503050406030204" pitchFamily="18" charset="0"/>
+                                <a:cs typeface="Arial" panose="020B0604020202020204" pitchFamily="34" charset="0"/>
+                              </a:rPr>
+                              <m:t>𝑧</m:t>
+                            </m:r>
+                          </m:e>
+                          <m:sub>
+                            <m:r>
+                              <a:rPr lang="en-US" b="0" i="1" smtClean="0">
+                                <a:latin typeface="Cambria Math" panose="02040503050406030204" pitchFamily="18" charset="0"/>
+                                <a:cs typeface="Arial" panose="020B0604020202020204" pitchFamily="34" charset="0"/>
+                              </a:rPr>
+                              <m:t>𝑡</m:t>
+                            </m:r>
+                          </m:sub>
+                        </m:sSub>
+                      </m:e>
+                    </m:rad>
+                    <m:sSub>
+                      <m:sSubPr>
+                        <m:ctrlPr>
+                          <a:rPr lang="en-US" b="0" i="1" smtClean="0">
+                            <a:latin typeface="Cambria Math" panose="02040503050406030204" pitchFamily="18" charset="0"/>
+                            <a:cs typeface="Arial" panose="020B0604020202020204" pitchFamily="34" charset="0"/>
+                          </a:rPr>
+                        </m:ctrlPr>
+                      </m:sSubPr>
+                      <m:e>
+                        <m:r>
+                          <a:rPr lang="en-US" b="0" i="1" smtClean="0">
+                            <a:latin typeface="Cambria Math" panose="02040503050406030204" pitchFamily="18" charset="0"/>
+                            <a:cs typeface="Arial" panose="020B0604020202020204" pitchFamily="34" charset="0"/>
+                          </a:rPr>
+                          <m:t>𝐺</m:t>
+                        </m:r>
+                      </m:e>
+                      <m:sub>
+                        <m:r>
+                          <a:rPr lang="en-US" b="0" i="1" smtClean="0">
+                            <a:latin typeface="Cambria Math" panose="02040503050406030204" pitchFamily="18" charset="0"/>
+                            <a:cs typeface="Arial" panose="020B0604020202020204" pitchFamily="34" charset="0"/>
+                          </a:rPr>
+                          <m:t>2</m:t>
+                        </m:r>
+                      </m:sub>
+                    </m:sSub>
+                    <m:r>
+                      <a:rPr lang="en-US" b="0" i="1" smtClean="0">
+                        <a:latin typeface="Cambria Math" panose="02040503050406030204" pitchFamily="18" charset="0"/>
+                        <a:cs typeface="Arial" panose="020B0604020202020204" pitchFamily="34" charset="0"/>
+                      </a:rPr>
+                      <m:t>          </m:t>
+                    </m:r>
+                    <m:sSub>
+                      <m:sSubPr>
+                        <m:ctrlPr>
+                          <a:rPr lang="en-US" b="0" i="1" smtClean="0">
+                            <a:latin typeface="Cambria Math" panose="02040503050406030204" pitchFamily="18" charset="0"/>
+                            <a:cs typeface="Arial" panose="020B0604020202020204" pitchFamily="34" charset="0"/>
+                          </a:rPr>
+                        </m:ctrlPr>
+                      </m:sSubPr>
+                      <m:e>
+                        <m:r>
+                          <a:rPr lang="en-US" b="0" i="1" smtClean="0">
+                            <a:latin typeface="Cambria Math" panose="02040503050406030204" pitchFamily="18" charset="0"/>
+                            <a:cs typeface="Arial" panose="020B0604020202020204" pitchFamily="34" charset="0"/>
+                          </a:rPr>
+                          <m:t>𝐺</m:t>
+                        </m:r>
+                      </m:e>
+                      <m:sub>
+                        <m:r>
+                          <a:rPr lang="en-US" b="0" i="1" smtClean="0">
+                            <a:latin typeface="Cambria Math" panose="02040503050406030204" pitchFamily="18" charset="0"/>
+                            <a:cs typeface="Arial" panose="020B0604020202020204" pitchFamily="34" charset="0"/>
+                          </a:rPr>
+                          <m:t>2</m:t>
+                        </m:r>
+                      </m:sub>
+                    </m:sSub>
+                    <m:r>
+                      <a:rPr lang="en-US" b="0" i="1" smtClean="0">
+                        <a:latin typeface="Cambria Math" panose="02040503050406030204" pitchFamily="18" charset="0"/>
+                        <a:cs typeface="Arial" panose="020B0604020202020204" pitchFamily="34" charset="0"/>
+                      </a:rPr>
+                      <m:t>~</m:t>
+                    </m:r>
+                    <m:r>
+                      <a:rPr lang="en-US" b="0" i="1" smtClean="0">
+                        <a:latin typeface="Cambria Math" panose="02040503050406030204" pitchFamily="18" charset="0"/>
+                        <a:cs typeface="Arial" panose="020B0604020202020204" pitchFamily="34" charset="0"/>
+                      </a:rPr>
+                      <m:t>𝑁</m:t>
+                    </m:r>
+                    <m:r>
+                      <a:rPr lang="en-US" b="0" i="1" smtClean="0">
+                        <a:latin typeface="Cambria Math" panose="02040503050406030204" pitchFamily="18" charset="0"/>
+                        <a:cs typeface="Arial" panose="020B0604020202020204" pitchFamily="34" charset="0"/>
+                      </a:rPr>
+                      <m:t>(0, 1)</m:t>
+                    </m:r>
+                  </m:oMath>
+                </a14:m>
+                <a:endParaRPr lang="en-US" dirty="0">
+                  <a:cs typeface="Arial" panose="020B0604020202020204" pitchFamily="34" charset="0"/>
+                </a:endParaRPr>
+              </a:p>
+            </p:txBody>
+          </p:sp>
+        </mc:Choice>
+        <mc:Fallback>
+          <p:sp>
+            <p:nvSpPr>
+              <p:cNvPr id="5" name="Content Placeholder 4">
+                <a:extLst>
+                  <a:ext uri="{FF2B5EF4-FFF2-40B4-BE49-F238E27FC236}">
+                    <a16:creationId xmlns:a16="http://schemas.microsoft.com/office/drawing/2014/main" id="{88D7A6F8-7E42-4FDB-A361-EFA01B1B33C7}"/>
+                  </a:ext>
+                </a:extLst>
+              </p:cNvPr>
+              <p:cNvSpPr>
+                <a:spLocks noGrp="1" noRot="1" noChangeAspect="1" noMove="1" noResize="1" noEditPoints="1" noAdjustHandles="1" noChangeArrowheads="1" noChangeShapeType="1" noTextEdit="1"/>
+              </p:cNvSpPr>
+              <p:nvPr>
+                <p:ph sz="half" idx="2"/>
+              </p:nvPr>
+            </p:nvSpPr>
+            <p:spPr>
+              <a:xfrm>
+                <a:off x="1097280" y="2577717"/>
+                <a:ext cx="4937760" cy="3286760"/>
+              </a:xfrm>
+              <a:blipFill>
+                <a:blip r:embed="rId2"/>
+                <a:stretch>
+                  <a:fillRect l="-2963" r="-1605"/>
+                </a:stretch>
+              </a:blipFill>
+            </p:spPr>
+            <p:txBody>
+              <a:bodyPr/>
+              <a:lstStyle/>
+              <a:p>
+                <a:r>
+                  <a:rPr lang="en-US">
+                    <a:noFill/>
+                  </a:rPr>
+                  <a:t> </a:t>
+                </a:r>
+              </a:p>
+            </p:txBody>
+          </p:sp>
+        </mc:Fallback>
+      </mc:AlternateContent>
+      <p:sp>
+        <p:nvSpPr>
+          <p:cNvPr id="6" name="Text Placeholder 5">
+            <a:extLst>
+              <a:ext uri="{FF2B5EF4-FFF2-40B4-BE49-F238E27FC236}">
+                <a16:creationId xmlns:a16="http://schemas.microsoft.com/office/drawing/2014/main" id="{D5E5C886-B1DA-4B62-89F6-9A4C18DC36E3}"/>
+              </a:ext>
+            </a:extLst>
+          </p:cNvPr>
+          <p:cNvSpPr>
+            <a:spLocks noGrp="1"/>
+          </p:cNvSpPr>
+          <p:nvPr>
+            <p:ph type="body" sz="quarter" idx="3"/>
+          </p:nvPr>
+        </p:nvSpPr>
+        <p:spPr/>
+        <p:txBody>
+          <a:bodyPr/>
+          <a:lstStyle/>
+          <a:p>
+            <a:r>
+              <a:rPr lang="en-US" dirty="0"/>
+              <a:t>Inverse-Transform Method</a:t>
+            </a:r>
+          </a:p>
+        </p:txBody>
+      </p:sp>
+      <mc:AlternateContent xmlns:mc="http://schemas.openxmlformats.org/markup-compatibility/2006" xmlns:a14="http://schemas.microsoft.com/office/drawing/2010/main">
+        <mc:Choice Requires="a14">
+          <p:sp>
+            <p:nvSpPr>
+              <p:cNvPr id="7" name="Content Placeholder 6">
+                <a:extLst>
+                  <a:ext uri="{FF2B5EF4-FFF2-40B4-BE49-F238E27FC236}">
+                    <a16:creationId xmlns:a16="http://schemas.microsoft.com/office/drawing/2014/main" id="{A6BB630E-A0CC-45EE-99A9-292DACBAA9AD}"/>
+                  </a:ext>
+                </a:extLst>
+              </p:cNvPr>
+              <p:cNvSpPr>
+                <a:spLocks noGrp="1"/>
+              </p:cNvSpPr>
+              <p:nvPr>
+                <p:ph sz="quarter" idx="4"/>
+              </p:nvPr>
+            </p:nvSpPr>
+            <p:spPr/>
+            <p:txBody>
+              <a:bodyPr/>
+              <a:lstStyle/>
+              <a:p>
+                <a14:m>
+                  <m:oMath xmlns:m="http://schemas.openxmlformats.org/officeDocument/2006/math">
+                    <m:sSub>
+                      <m:sSubPr>
+                        <m:ctrlPr>
+                          <a:rPr lang="en-US" sz="2400" i="1" smtClean="0">
+                            <a:latin typeface="Cambria Math" panose="02040503050406030204" pitchFamily="18" charset="0"/>
+                          </a:rPr>
+                        </m:ctrlPr>
+                      </m:sSubPr>
+                      <m:e>
+                        <m:r>
+                          <a:rPr lang="en-US" sz="2400" i="1">
+                            <a:latin typeface="Cambria Math" panose="02040503050406030204" pitchFamily="18" charset="0"/>
+                          </a:rPr>
+                          <m:t>𝑆</m:t>
+                        </m:r>
+                      </m:e>
+                      <m:sub>
+                        <m:r>
+                          <a:rPr lang="en-US" sz="2400" i="1">
+                            <a:latin typeface="Cambria Math" panose="02040503050406030204" pitchFamily="18" charset="0"/>
+                          </a:rPr>
+                          <m:t>𝑇</m:t>
+                        </m:r>
+                      </m:sub>
+                    </m:sSub>
+                    <m:r>
+                      <a:rPr lang="en-US" sz="2400" i="1">
+                        <a:latin typeface="Cambria Math" panose="02040503050406030204" pitchFamily="18" charset="0"/>
+                      </a:rPr>
+                      <m:t>=</m:t>
+                    </m:r>
+                    <m:sSub>
+                      <m:sSubPr>
+                        <m:ctrlPr>
+                          <a:rPr lang="en-US" sz="2400" i="1">
+                            <a:latin typeface="Cambria Math" panose="02040503050406030204" pitchFamily="18" charset="0"/>
+                          </a:rPr>
+                        </m:ctrlPr>
+                      </m:sSubPr>
+                      <m:e>
+                        <m:r>
+                          <a:rPr lang="en-US" sz="2400" i="1">
+                            <a:latin typeface="Cambria Math" panose="02040503050406030204" pitchFamily="18" charset="0"/>
+                          </a:rPr>
+                          <m:t>𝑆</m:t>
+                        </m:r>
+                      </m:e>
+                      <m:sub>
+                        <m:r>
+                          <a:rPr lang="en-US" sz="2400" i="1">
+                            <a:latin typeface="Cambria Math" panose="02040503050406030204" pitchFamily="18" charset="0"/>
+                          </a:rPr>
+                          <m:t>0</m:t>
+                        </m:r>
+                      </m:sub>
+                    </m:sSub>
+                    <m:r>
+                      <a:rPr lang="en-US" sz="2400" i="1">
+                        <a:latin typeface="Cambria Math" panose="02040503050406030204" pitchFamily="18" charset="0"/>
+                      </a:rPr>
+                      <m:t>∗</m:t>
+                    </m:r>
+                    <m:sSup>
+                      <m:sSupPr>
+                        <m:ctrlPr>
+                          <a:rPr lang="en-US" sz="2400" i="1">
+                            <a:latin typeface="Cambria Math" panose="02040503050406030204" pitchFamily="18" charset="0"/>
+                          </a:rPr>
+                        </m:ctrlPr>
+                      </m:sSupPr>
+                      <m:e>
+                        <m:r>
+                          <a:rPr lang="en-US" sz="2400" i="1">
+                            <a:latin typeface="Cambria Math" panose="02040503050406030204" pitchFamily="18" charset="0"/>
+                          </a:rPr>
+                          <m:t>𝑒</m:t>
+                        </m:r>
+                      </m:e>
+                      <m:sup>
+                        <m:sSub>
+                          <m:sSubPr>
+                            <m:ctrlPr>
+                              <a:rPr lang="en-US" sz="2400" i="1">
+                                <a:latin typeface="Cambria Math" panose="02040503050406030204" pitchFamily="18" charset="0"/>
+                              </a:rPr>
+                            </m:ctrlPr>
+                          </m:sSubPr>
+                          <m:e>
+                            <m:r>
+                              <a:rPr lang="en-US" sz="2400" i="1">
+                                <a:latin typeface="Cambria Math" panose="02040503050406030204" pitchFamily="18" charset="0"/>
+                              </a:rPr>
+                              <m:t>𝑋</m:t>
+                            </m:r>
+                          </m:e>
+                          <m:sub>
+                            <m:r>
+                              <a:rPr lang="en-US" sz="2400" i="1">
+                                <a:latin typeface="Cambria Math" panose="02040503050406030204" pitchFamily="18" charset="0"/>
+                              </a:rPr>
+                              <m:t>𝑇</m:t>
+                            </m:r>
+                          </m:sub>
+                        </m:sSub>
+                      </m:sup>
+                    </m:sSup>
+                  </m:oMath>
+                </a14:m>
+                <a:endParaRPr lang="en-US" sz="2400" dirty="0"/>
+              </a:p>
+              <a:p>
+                <a:pPr indent="-182880">
+                  <a:buFont typeface="Arial" panose="020B0604020202020204" pitchFamily="34" charset="0"/>
+                  <a:buChar char="•"/>
+                </a:pPr>
+                <a:r>
+                  <a:rPr lang="en-US" dirty="0">
+                    <a:cs typeface="Arial" panose="020B0604020202020204" pitchFamily="34" charset="0"/>
+                  </a:rPr>
+                  <a:t>Simulate a random variable </a:t>
+                </a:r>
+                <a14:m>
+                  <m:oMath xmlns:m="http://schemas.openxmlformats.org/officeDocument/2006/math">
+                    <m:r>
+                      <m:rPr>
+                        <m:sty m:val="p"/>
+                      </m:rPr>
+                      <a:rPr lang="en-US" b="0" i="0" smtClean="0">
+                        <a:latin typeface="Cambria Math" panose="02040503050406030204" pitchFamily="18" charset="0"/>
+                        <a:cs typeface="Arial" panose="020B0604020202020204" pitchFamily="34" charset="0"/>
+                      </a:rPr>
+                      <m:t>U</m:t>
+                    </m:r>
+                    <m:r>
+                      <a:rPr lang="en-US" b="0" i="0" smtClean="0">
+                        <a:latin typeface="Cambria Math" panose="02040503050406030204" pitchFamily="18" charset="0"/>
+                        <a:cs typeface="Arial" panose="020B0604020202020204" pitchFamily="34" charset="0"/>
+                      </a:rPr>
+                      <m:t>~</m:t>
+                    </m:r>
+                    <m:r>
+                      <a:rPr lang="en-US" b="0" i="1" smtClean="0">
+                        <a:latin typeface="Cambria Math" panose="02040503050406030204" pitchFamily="18" charset="0"/>
+                        <a:cs typeface="Arial" panose="020B0604020202020204" pitchFamily="34" charset="0"/>
+                      </a:rPr>
+                      <m:t>𝑈𝑛𝑖𝑓</m:t>
+                    </m:r>
+                    <m:r>
+                      <a:rPr lang="en-US" b="0" i="1" smtClean="0">
+                        <a:latin typeface="Cambria Math" panose="02040503050406030204" pitchFamily="18" charset="0"/>
+                        <a:cs typeface="Arial" panose="020B0604020202020204" pitchFamily="34" charset="0"/>
+                      </a:rPr>
+                      <m:t>(0, 1)</m:t>
+                    </m:r>
+                  </m:oMath>
+                </a14:m>
+                <a:endParaRPr lang="en-US" dirty="0">
+                  <a:cs typeface="Arial" panose="020B0604020202020204" pitchFamily="34" charset="0"/>
+                </a:endParaRPr>
+              </a:p>
+              <a:p>
+                <a:pPr indent="-182880">
+                  <a:buFont typeface="Arial" panose="020B0604020202020204" pitchFamily="34" charset="0"/>
+                  <a:buChar char="•"/>
+                </a:pPr>
+                <a:r>
+                  <a:rPr lang="en-US" dirty="0">
+                    <a:cs typeface="Arial" panose="020B0604020202020204" pitchFamily="34" charset="0"/>
+                  </a:rPr>
+                  <a:t>Approximate </a:t>
+                </a:r>
+                <a14:m>
+                  <m:oMath xmlns:m="http://schemas.openxmlformats.org/officeDocument/2006/math">
+                    <m:sSup>
+                      <m:sSupPr>
+                        <m:ctrlPr>
+                          <a:rPr lang="en-US" b="0" i="1" smtClean="0">
+                            <a:latin typeface="Cambria Math" panose="02040503050406030204" pitchFamily="18" charset="0"/>
+                            <a:cs typeface="Arial" panose="020B0604020202020204" pitchFamily="34" charset="0"/>
+                          </a:rPr>
+                        </m:ctrlPr>
+                      </m:sSupPr>
+                      <m:e>
+                        <m:r>
+                          <a:rPr lang="en-US" b="0" i="1" smtClean="0">
+                            <a:latin typeface="Cambria Math" panose="02040503050406030204" pitchFamily="18" charset="0"/>
+                            <a:cs typeface="Arial" panose="020B0604020202020204" pitchFamily="34" charset="0"/>
+                          </a:rPr>
+                          <m:t>𝐹</m:t>
+                        </m:r>
+                      </m:e>
+                      <m:sup>
+                        <m:r>
+                          <a:rPr lang="en-US" b="0" i="1" smtClean="0">
+                            <a:latin typeface="Cambria Math" panose="02040503050406030204" pitchFamily="18" charset="0"/>
+                            <a:cs typeface="Arial" panose="020B0604020202020204" pitchFamily="34" charset="0"/>
+                          </a:rPr>
+                          <m:t>−1</m:t>
+                        </m:r>
+                      </m:sup>
+                    </m:sSup>
+                    <m:d>
+                      <m:dPr>
+                        <m:ctrlPr>
+                          <a:rPr lang="en-US" b="0" i="1" smtClean="0">
+                            <a:latin typeface="Cambria Math" panose="02040503050406030204" pitchFamily="18" charset="0"/>
+                            <a:cs typeface="Arial" panose="020B0604020202020204" pitchFamily="34" charset="0"/>
+                          </a:rPr>
+                        </m:ctrlPr>
+                      </m:dPr>
+                      <m:e>
+                        <m:r>
+                          <a:rPr lang="en-US" b="0" i="1" smtClean="0">
+                            <a:latin typeface="Cambria Math" panose="02040503050406030204" pitchFamily="18" charset="0"/>
+                            <a:cs typeface="Arial" panose="020B0604020202020204" pitchFamily="34" charset="0"/>
+                          </a:rPr>
+                          <m:t>𝑈</m:t>
+                        </m:r>
+                      </m:e>
+                    </m:d>
+                  </m:oMath>
+                </a14:m>
+                <a:r>
+                  <a:rPr lang="en-US" dirty="0"/>
+                  <a:t> via binary search:</a:t>
+                </a:r>
+              </a:p>
+              <a:p>
+                <a:pPr indent="-182880">
+                  <a:buFont typeface="Arial" panose="020B0604020202020204" pitchFamily="34" charset="0"/>
+                  <a:buChar char="•"/>
+                </a:pPr>
+                <a:endParaRPr lang="en-US" sz="100" b="0" i="1" dirty="0">
+                  <a:latin typeface="Cambria Math" panose="02040503050406030204" pitchFamily="18" charset="0"/>
+                </a:endParaRPr>
+              </a:p>
+              <a:p>
+                <a:pPr marL="0" indent="0">
+                  <a:buNone/>
+                </a:pPr>
+                <a14:m>
+                  <m:oMathPara xmlns:m="http://schemas.openxmlformats.org/officeDocument/2006/math">
+                    <m:oMathParaPr>
+                      <m:jc m:val="center"/>
+                    </m:oMathParaPr>
+                    <m:oMath xmlns:m="http://schemas.openxmlformats.org/officeDocument/2006/math">
+                      <m:sSub>
+                        <m:sSubPr>
+                          <m:ctrlPr>
+                            <a:rPr lang="en-US" b="0" i="1" smtClean="0">
+                              <a:latin typeface="Cambria Math" panose="02040503050406030204" pitchFamily="18" charset="0"/>
+                            </a:rPr>
+                          </m:ctrlPr>
+                        </m:sSubPr>
+                        <m:e>
+                          <m:r>
+                            <a:rPr lang="en-US" b="0" i="1" smtClean="0">
+                              <a:latin typeface="Cambria Math" panose="02040503050406030204" pitchFamily="18" charset="0"/>
+                            </a:rPr>
+                            <m:t>𝑥</m:t>
+                          </m:r>
+                        </m:e>
+                        <m:sub>
+                          <m:r>
+                            <a:rPr lang="en-US" b="0" i="1" smtClean="0">
+                              <a:latin typeface="Cambria Math" panose="02040503050406030204" pitchFamily="18" charset="0"/>
+                            </a:rPr>
+                            <m:t>𝑘</m:t>
+                          </m:r>
+                        </m:sub>
+                      </m:sSub>
+                      <m:r>
+                        <a:rPr lang="en-US" b="0" i="1" smtClean="0">
+                          <a:latin typeface="Cambria Math" panose="02040503050406030204" pitchFamily="18" charset="0"/>
+                        </a:rPr>
+                        <m:t>+</m:t>
+                      </m:r>
+                      <m:f>
+                        <m:fPr>
+                          <m:ctrlPr>
+                            <a:rPr lang="en-US" b="0" i="1" smtClean="0">
+                              <a:latin typeface="Cambria Math" panose="02040503050406030204" pitchFamily="18" charset="0"/>
+                            </a:rPr>
+                          </m:ctrlPr>
+                        </m:fPr>
+                        <m:num>
+                          <m:sSub>
+                            <m:sSubPr>
+                              <m:ctrlPr>
+                                <a:rPr lang="en-US" b="0" i="1" smtClean="0">
+                                  <a:latin typeface="Cambria Math" panose="02040503050406030204" pitchFamily="18" charset="0"/>
+                                </a:rPr>
+                              </m:ctrlPr>
+                            </m:sSubPr>
+                            <m:e>
+                              <m:r>
+                                <a:rPr lang="en-US" b="0" i="1" smtClean="0">
+                                  <a:latin typeface="Cambria Math" panose="02040503050406030204" pitchFamily="18" charset="0"/>
+                                </a:rPr>
+                                <m:t>𝑥</m:t>
+                              </m:r>
+                            </m:e>
+                            <m:sub>
+                              <m:r>
+                                <a:rPr lang="en-US" b="0" i="1" smtClean="0">
+                                  <a:latin typeface="Cambria Math" panose="02040503050406030204" pitchFamily="18" charset="0"/>
+                                </a:rPr>
+                                <m:t>𝑘</m:t>
+                              </m:r>
+                              <m:r>
+                                <a:rPr lang="en-US" b="0" i="1" smtClean="0">
+                                  <a:latin typeface="Cambria Math" panose="02040503050406030204" pitchFamily="18" charset="0"/>
+                                </a:rPr>
+                                <m:t>+1</m:t>
+                              </m:r>
+                            </m:sub>
+                          </m:sSub>
+                          <m:r>
+                            <a:rPr lang="en-US" b="0" i="1" smtClean="0">
+                              <a:latin typeface="Cambria Math" panose="02040503050406030204" pitchFamily="18" charset="0"/>
+                            </a:rPr>
+                            <m:t>−</m:t>
+                          </m:r>
+                          <m:sSub>
+                            <m:sSubPr>
+                              <m:ctrlPr>
+                                <a:rPr lang="en-US" b="0" i="1" smtClean="0">
+                                  <a:latin typeface="Cambria Math" panose="02040503050406030204" pitchFamily="18" charset="0"/>
+                                </a:rPr>
+                              </m:ctrlPr>
+                            </m:sSubPr>
+                            <m:e>
+                              <m:r>
+                                <a:rPr lang="en-US" b="0" i="1" smtClean="0">
+                                  <a:latin typeface="Cambria Math" panose="02040503050406030204" pitchFamily="18" charset="0"/>
+                                </a:rPr>
+                                <m:t>𝑥</m:t>
+                              </m:r>
+                            </m:e>
+                            <m:sub>
+                              <m:r>
+                                <a:rPr lang="en-US" b="0" i="1" smtClean="0">
+                                  <a:latin typeface="Cambria Math" panose="02040503050406030204" pitchFamily="18" charset="0"/>
+                                </a:rPr>
+                                <m:t>𝑘</m:t>
+                              </m:r>
+                            </m:sub>
+                          </m:sSub>
+                        </m:num>
+                        <m:den>
+                          <m:sSub>
+                            <m:sSubPr>
+                              <m:ctrlPr>
+                                <a:rPr lang="en-US" sz="2400" b="0" i="1" smtClean="0">
+                                  <a:latin typeface="Cambria Math" panose="02040503050406030204" pitchFamily="18" charset="0"/>
+                                </a:rPr>
+                              </m:ctrlPr>
+                            </m:sSubPr>
+                            <m:e>
+                              <m:acc>
+                                <m:accPr>
+                                  <m:chr m:val="̂"/>
+                                  <m:ctrlPr>
+                                    <a:rPr lang="en-US" b="0" i="1" smtClean="0">
+                                      <a:latin typeface="Cambria Math" panose="02040503050406030204" pitchFamily="18" charset="0"/>
+                                    </a:rPr>
+                                  </m:ctrlPr>
+                                </m:accPr>
+                                <m:e>
+                                  <m:r>
+                                    <a:rPr lang="en-US" b="0" i="1" smtClean="0">
+                                      <a:latin typeface="Cambria Math" panose="02040503050406030204" pitchFamily="18" charset="0"/>
+                                    </a:rPr>
+                                    <m:t>𝐹</m:t>
+                                  </m:r>
+                                </m:e>
+                              </m:acc>
+                            </m:e>
+                            <m:sub>
+                              <m:r>
+                                <a:rPr lang="en-US" sz="2400" b="0" i="1" smtClean="0">
+                                  <a:latin typeface="Cambria Math" panose="02040503050406030204" pitchFamily="18" charset="0"/>
+                                </a:rPr>
+                                <m:t>𝑘</m:t>
+                              </m:r>
+                              <m:r>
+                                <a:rPr lang="en-US" sz="2400" b="0" i="1" smtClean="0">
+                                  <a:latin typeface="Cambria Math" panose="02040503050406030204" pitchFamily="18" charset="0"/>
+                                </a:rPr>
+                                <m:t>+1</m:t>
+                              </m:r>
+                            </m:sub>
+                          </m:sSub>
+                          <m:r>
+                            <a:rPr lang="en-US" sz="2400" b="0" i="1" smtClean="0">
+                              <a:latin typeface="Cambria Math" panose="02040503050406030204" pitchFamily="18" charset="0"/>
+                            </a:rPr>
+                            <m:t>−</m:t>
+                          </m:r>
+                          <m:sSub>
+                            <m:sSubPr>
+                              <m:ctrlPr>
+                                <a:rPr lang="en-US" sz="2400" b="0" i="1" smtClean="0">
+                                  <a:latin typeface="Cambria Math" panose="02040503050406030204" pitchFamily="18" charset="0"/>
+                                </a:rPr>
+                              </m:ctrlPr>
+                            </m:sSubPr>
+                            <m:e>
+                              <m:acc>
+                                <m:accPr>
+                                  <m:chr m:val="̂"/>
+                                  <m:ctrlPr>
+                                    <a:rPr lang="en-US" sz="2400" b="0" i="1" smtClean="0">
+                                      <a:latin typeface="Cambria Math" panose="02040503050406030204" pitchFamily="18" charset="0"/>
+                                    </a:rPr>
+                                  </m:ctrlPr>
+                                </m:accPr>
+                                <m:e>
+                                  <m:r>
+                                    <a:rPr lang="en-US" sz="2400" b="0" i="1" smtClean="0">
+                                      <a:latin typeface="Cambria Math" panose="02040503050406030204" pitchFamily="18" charset="0"/>
+                                    </a:rPr>
+                                    <m:t>𝐹</m:t>
+                                  </m:r>
+                                </m:e>
+                              </m:acc>
+                            </m:e>
+                            <m:sub>
+                              <m:r>
+                                <a:rPr lang="en-US" sz="2400" b="0" i="1" smtClean="0">
+                                  <a:latin typeface="Cambria Math" panose="02040503050406030204" pitchFamily="18" charset="0"/>
+                                </a:rPr>
+                                <m:t>𝑘</m:t>
+                              </m:r>
+                            </m:sub>
+                          </m:sSub>
+                        </m:den>
+                      </m:f>
+                      <m:r>
+                        <a:rPr lang="en-US" b="0" i="1" smtClean="0">
+                          <a:latin typeface="Cambria Math" panose="02040503050406030204" pitchFamily="18" charset="0"/>
+                        </a:rPr>
+                        <m:t>(</m:t>
+                      </m:r>
+                      <m:r>
+                        <a:rPr lang="en-US" b="0" i="1" smtClean="0">
+                          <a:latin typeface="Cambria Math" panose="02040503050406030204" pitchFamily="18" charset="0"/>
+                        </a:rPr>
+                        <m:t>𝑈</m:t>
+                      </m:r>
+                      <m:r>
+                        <a:rPr lang="en-US" b="0" i="1" smtClean="0">
+                          <a:latin typeface="Cambria Math" panose="02040503050406030204" pitchFamily="18" charset="0"/>
+                        </a:rPr>
+                        <m:t>−</m:t>
+                      </m:r>
+                      <m:sSub>
+                        <m:sSubPr>
+                          <m:ctrlPr>
+                            <a:rPr lang="en-US" b="0" i="1" smtClean="0">
+                              <a:latin typeface="Cambria Math" panose="02040503050406030204" pitchFamily="18" charset="0"/>
+                            </a:rPr>
+                          </m:ctrlPr>
+                        </m:sSubPr>
+                        <m:e>
+                          <m:acc>
+                            <m:accPr>
+                              <m:chr m:val="̂"/>
+                              <m:ctrlPr>
+                                <a:rPr lang="en-US" b="0" i="1" smtClean="0">
+                                  <a:latin typeface="Cambria Math" panose="02040503050406030204" pitchFamily="18" charset="0"/>
+                                </a:rPr>
+                              </m:ctrlPr>
+                            </m:accPr>
+                            <m:e>
+                              <m:r>
+                                <a:rPr lang="en-US" b="0" i="1" smtClean="0">
+                                  <a:latin typeface="Cambria Math" panose="02040503050406030204" pitchFamily="18" charset="0"/>
+                                </a:rPr>
+                                <m:t>𝐹</m:t>
+                              </m:r>
+                            </m:e>
+                          </m:acc>
+                        </m:e>
+                        <m:sub>
+                          <m:r>
+                            <a:rPr lang="en-US" b="0" i="1" smtClean="0">
+                              <a:latin typeface="Cambria Math" panose="02040503050406030204" pitchFamily="18" charset="0"/>
+                            </a:rPr>
+                            <m:t>𝑘</m:t>
+                          </m:r>
+                        </m:sub>
+                      </m:sSub>
+                      <m:r>
+                        <a:rPr lang="en-US" b="0" i="1" smtClean="0">
+                          <a:latin typeface="Cambria Math" panose="02040503050406030204" pitchFamily="18" charset="0"/>
+                        </a:rPr>
+                        <m:t>)</m:t>
+                      </m:r>
+                    </m:oMath>
+                  </m:oMathPara>
+                </a14:m>
+                <a:endParaRPr lang="en-US" dirty="0"/>
+              </a:p>
+            </p:txBody>
+          </p:sp>
+        </mc:Choice>
+        <mc:Fallback xmlns="">
+          <p:sp>
+            <p:nvSpPr>
+              <p:cNvPr id="7" name="Content Placeholder 6">
+                <a:extLst>
+                  <a:ext uri="{FF2B5EF4-FFF2-40B4-BE49-F238E27FC236}">
+                    <a16:creationId xmlns:a16="http://schemas.microsoft.com/office/drawing/2014/main" id="{A6BB630E-A0CC-45EE-99A9-292DACBAA9AD}"/>
+                  </a:ext>
+                </a:extLst>
+              </p:cNvPr>
+              <p:cNvSpPr>
+                <a:spLocks noGrp="1" noRot="1" noChangeAspect="1" noMove="1" noResize="1" noEditPoints="1" noAdjustHandles="1" noChangeArrowheads="1" noChangeShapeType="1" noTextEdit="1"/>
+              </p:cNvSpPr>
+              <p:nvPr>
+                <p:ph sz="quarter" idx="4"/>
+              </p:nvPr>
+            </p:nvSpPr>
+            <p:spPr>
+              <a:blipFill>
+                <a:blip r:embed="rId3"/>
+                <a:stretch>
+                  <a:fillRect l="-2963"/>
+                </a:stretch>
+              </a:blipFill>
+            </p:spPr>
+            <p:txBody>
+              <a:bodyPr/>
+              <a:lstStyle/>
+              <a:p>
+                <a:r>
+                  <a:rPr lang="en-US">
+                    <a:noFill/>
+                  </a:rPr>
+                  <a:t> </a:t>
+                </a:r>
+              </a:p>
+            </p:txBody>
+          </p:sp>
+        </mc:Fallback>
+      </mc:AlternateContent>
+      <p:sp>
+        <p:nvSpPr>
+          <p:cNvPr id="8" name="TextBox 7">
+            <a:extLst>
+              <a:ext uri="{FF2B5EF4-FFF2-40B4-BE49-F238E27FC236}">
+                <a16:creationId xmlns:a16="http://schemas.microsoft.com/office/drawing/2014/main" id="{57DFE35C-40CA-4FE9-964D-C054E6BFABC3}"/>
+              </a:ext>
+            </a:extLst>
+          </p:cNvPr>
+          <p:cNvSpPr txBox="1"/>
+          <p:nvPr/>
+        </p:nvSpPr>
+        <p:spPr>
+          <a:xfrm>
+            <a:off x="1097280" y="5959366"/>
+            <a:ext cx="45719" cy="369332"/>
+          </a:xfrm>
+          <a:prstGeom prst="rect">
+            <a:avLst/>
+          </a:prstGeom>
+          <a:noFill/>
+        </p:spPr>
+        <p:txBody>
+          <a:bodyPr wrap="square" rtlCol="0">
+            <a:spAutoFit/>
+          </a:bodyPr>
+          <a:lstStyle/>
+          <a:p>
+            <a:endParaRPr lang="en-US" dirty="0"/>
           </a:p>
         </p:txBody>
       </p:sp>
@@ -3971,47 +5451,64 @@
             <p:ph type="title"/>
           </p:nvPr>
         </p:nvSpPr>
-        <p:spPr/>
+        <p:spPr>
+          <a:xfrm>
+            <a:off x="1097280" y="286603"/>
+            <a:ext cx="10058400" cy="1450757"/>
+          </a:xfrm>
+        </p:spPr>
         <p:txBody>
           <a:bodyPr/>
           <a:lstStyle/>
           <a:p>
             <a:r>
               <a:rPr lang="en-US" dirty="0"/>
-              <a:t>NIG</a:t>
-            </a:r>
-          </a:p>
-        </p:txBody>
-      </p:sp>
-      <p:sp>
-        <p:nvSpPr>
-          <p:cNvPr id="3" name="Content Placeholder 2">
+              <a:t>Normal Inverse Gaussian Algorithm</a:t>
+            </a:r>
+          </a:p>
+        </p:txBody>
+      </p:sp>
+      <p:pic>
+        <p:nvPicPr>
+          <p:cNvPr id="7" name="Content Placeholder 6">
             <a:extLst>
               <a:ext uri="{FF2B5EF4-FFF2-40B4-BE49-F238E27FC236}">
-                <a16:creationId xmlns:a16="http://schemas.microsoft.com/office/drawing/2014/main" id="{19D5D9B4-FC20-4C37-AEF8-7265098D511C}"/>
+                <a16:creationId xmlns:a16="http://schemas.microsoft.com/office/drawing/2014/main" id="{92BA781D-8E2A-4767-8F94-87E6F22C7A99}"/>
               </a:ext>
             </a:extLst>
           </p:cNvPr>
-          <p:cNvSpPr>
-            <a:spLocks noGrp="1"/>
-          </p:cNvSpPr>
+          <p:cNvPicPr>
+            <a:picLocks noGrp="1" noChangeAspect="1"/>
+          </p:cNvPicPr>
           <p:nvPr>
             <p:ph idx="1"/>
           </p:nvPr>
-        </p:nvSpPr>
-        <p:spPr/>
-        <p:txBody>
-          <a:bodyPr/>
-          <a:lstStyle/>
-          <a:p>
-            <a:endParaRPr lang="en-US"/>
-          </a:p>
-        </p:txBody>
-      </p:sp>
+        </p:nvPicPr>
+        <p:blipFill>
+          <a:blip r:embed="rId2"/>
+          <a:stretch>
+            <a:fillRect/>
+          </a:stretch>
+        </p:blipFill>
+        <p:spPr>
+          <a:xfrm>
+            <a:off x="1097280" y="1844561"/>
+            <a:ext cx="8303853" cy="4371512"/>
+          </a:xfrm>
+          <a:prstGeom prst="rect">
+            <a:avLst/>
+          </a:prstGeom>
+          <a:ln>
+            <a:solidFill>
+              <a:schemeClr val="tx1"/>
+            </a:solidFill>
+          </a:ln>
+        </p:spPr>
+      </p:pic>
     </p:spTree>
     <p:extLst>
       <p:ext uri="{BB962C8B-B14F-4D97-AF65-F5344CB8AC3E}">
-        <p14:creationId xmlns:p14="http://schemas.microsoft.com/office/powerpoint/2010/main" val="4145850430"/>
+        <p14:creationId xmlns:p14="http://schemas.microsoft.com/office/powerpoint/2010/main" val="1418679565"/>
       </p:ext>
     </p:extLst>
   </p:cSld>
@@ -4043,7 +5540,7 @@
           <p:cNvPr id="2" name="Title 1">
             <a:extLst>
               <a:ext uri="{FF2B5EF4-FFF2-40B4-BE49-F238E27FC236}">
-                <a16:creationId xmlns:a16="http://schemas.microsoft.com/office/drawing/2014/main" id="{F67BEE7D-34DB-4D77-91DB-FDC6132A71E1}"/>
+                <a16:creationId xmlns:a16="http://schemas.microsoft.com/office/drawing/2014/main" id="{31F05B1E-50EE-49B6-A2D4-3734C1688B30}"/>
               </a:ext>
             </a:extLst>
           </p:cNvPr>
@@ -4061,40 +5558,49 @@
           <a:p>
             <a:r>
               <a:rPr lang="en-US" dirty="0"/>
-              <a:t>Inverse Transform</a:t>
-            </a:r>
-          </a:p>
-        </p:txBody>
-      </p:sp>
-      <p:sp>
-        <p:nvSpPr>
-          <p:cNvPr id="3" name="Content Placeholder 2">
+              <a:t>NIG Distribution</a:t>
+            </a:r>
+          </a:p>
+        </p:txBody>
+      </p:sp>
+      <p:pic>
+        <p:nvPicPr>
+          <p:cNvPr id="8" name="Content Placeholder 7" descr="A picture containing boat, water&#10;&#10;Description automatically generated">
             <a:extLst>
               <a:ext uri="{FF2B5EF4-FFF2-40B4-BE49-F238E27FC236}">
-                <a16:creationId xmlns:a16="http://schemas.microsoft.com/office/drawing/2014/main" id="{9F9825DC-7AC1-46E9-B5D1-E85E0F695787}"/>
+                <a16:creationId xmlns:a16="http://schemas.microsoft.com/office/drawing/2014/main" id="{20D5A634-D357-478C-9594-31193CD3460F}"/>
               </a:ext>
             </a:extLst>
           </p:cNvPr>
-          <p:cNvSpPr>
-            <a:spLocks noGrp="1"/>
-          </p:cNvSpPr>
-          <p:nvPr>
-            <p:ph idx="1"/>
-          </p:nvPr>
-        </p:nvSpPr>
-        <p:spPr/>
-        <p:txBody>
-          <a:bodyPr/>
-          <a:lstStyle/>
-          <a:p>
-            <a:endParaRPr lang="en-US"/>
-          </a:p>
-        </p:txBody>
-      </p:sp>
+          <p:cNvPicPr>
+            <a:picLocks noGrp="1" noChangeAspect="1"/>
+          </p:cNvPicPr>
+          <p:nvPr>
+            <p:ph sz="half" idx="2"/>
+          </p:nvPr>
+        </p:nvPicPr>
+        <p:blipFill>
+          <a:blip r:embed="rId2"/>
+          <a:stretch>
+            <a:fillRect/>
+          </a:stretch>
+        </p:blipFill>
+        <p:spPr>
+          <a:xfrm>
+            <a:off x="1097279" y="1850352"/>
+            <a:ext cx="10058400" cy="4310302"/>
+          </a:xfrm>
+          <a:ln>
+            <a:solidFill>
+              <a:schemeClr val="tx1"/>
+            </a:solidFill>
+          </a:ln>
+        </p:spPr>
+      </p:pic>
     </p:spTree>
     <p:extLst>
       <p:ext uri="{BB962C8B-B14F-4D97-AF65-F5344CB8AC3E}">
-        <p14:creationId xmlns:p14="http://schemas.microsoft.com/office/powerpoint/2010/main" val="627838685"/>
+        <p14:creationId xmlns:p14="http://schemas.microsoft.com/office/powerpoint/2010/main" val="4145850430"/>
       </p:ext>
     </p:extLst>
   </p:cSld>
@@ -4126,7 +5632,7 @@
           <p:cNvPr id="2" name="Title 1">
             <a:extLst>
               <a:ext uri="{FF2B5EF4-FFF2-40B4-BE49-F238E27FC236}">
-                <a16:creationId xmlns:a16="http://schemas.microsoft.com/office/drawing/2014/main" id="{961C48E0-30D0-4735-B980-D5848818C893}"/>
+                <a16:creationId xmlns:a16="http://schemas.microsoft.com/office/drawing/2014/main" id="{31F05B1E-50EE-49B6-A2D4-3734C1688B30}"/>
               </a:ext>
             </a:extLst>
           </p:cNvPr>
@@ -4144,40 +5650,50 @@
           <a:p>
             <a:r>
               <a:rPr lang="en-US" dirty="0"/>
-              <a:t>Comparison</a:t>
-            </a:r>
-          </a:p>
-        </p:txBody>
-      </p:sp>
-      <p:sp>
-        <p:nvSpPr>
-          <p:cNvPr id="3" name="Content Placeholder 2">
+              <a:t>Inverse-Transform Algorithm</a:t>
+            </a:r>
+          </a:p>
+        </p:txBody>
+      </p:sp>
+      <p:pic>
+        <p:nvPicPr>
+          <p:cNvPr id="8" name="Picture 7">
             <a:extLst>
               <a:ext uri="{FF2B5EF4-FFF2-40B4-BE49-F238E27FC236}">
-                <a16:creationId xmlns:a16="http://schemas.microsoft.com/office/drawing/2014/main" id="{A2A6B784-C8AE-4EDC-8C73-885C3F319FC2}"/>
+                <a16:creationId xmlns:a16="http://schemas.microsoft.com/office/drawing/2014/main" id="{3EF231DE-180C-42FA-8CA0-1D7ED42576B5}"/>
               </a:ext>
             </a:extLst>
           </p:cNvPr>
-          <p:cNvSpPr>
-            <a:spLocks noGrp="1"/>
-          </p:cNvSpPr>
-          <p:nvPr>
-            <p:ph idx="1"/>
-          </p:nvPr>
-        </p:nvSpPr>
-        <p:spPr/>
-        <p:txBody>
-          <a:bodyPr/>
-          <a:lstStyle/>
-          <a:p>
-            <a:endParaRPr lang="en-US"/>
-          </a:p>
-        </p:txBody>
-      </p:sp>
+          <p:cNvPicPr>
+            <a:picLocks noChangeAspect="1"/>
+          </p:cNvPicPr>
+          <p:nvPr/>
+        </p:nvPicPr>
+        <p:blipFill>
+          <a:blip r:embed="rId2"/>
+          <a:stretch>
+            <a:fillRect/>
+          </a:stretch>
+        </p:blipFill>
+        <p:spPr>
+          <a:xfrm>
+            <a:off x="1097280" y="1842360"/>
+            <a:ext cx="6568415" cy="4099614"/>
+          </a:xfrm>
+          <a:prstGeom prst="rect">
+            <a:avLst/>
+          </a:prstGeom>
+          <a:ln>
+            <a:solidFill>
+              <a:schemeClr val="tx1"/>
+            </a:solidFill>
+          </a:ln>
+        </p:spPr>
+      </p:pic>
     </p:spTree>
     <p:extLst>
       <p:ext uri="{BB962C8B-B14F-4D97-AF65-F5344CB8AC3E}">
-        <p14:creationId xmlns:p14="http://schemas.microsoft.com/office/powerpoint/2010/main" val="3198049024"/>
+        <p14:creationId xmlns:p14="http://schemas.microsoft.com/office/powerpoint/2010/main" val="2599024257"/>
       </p:ext>
     </p:extLst>
   </p:cSld>
@@ -4209,6 +5725,89 @@
           <p:cNvPr id="2" name="Title 1">
             <a:extLst>
               <a:ext uri="{FF2B5EF4-FFF2-40B4-BE49-F238E27FC236}">
+                <a16:creationId xmlns:a16="http://schemas.microsoft.com/office/drawing/2014/main" id="{961C48E0-30D0-4735-B980-D5848818C893}"/>
+              </a:ext>
+            </a:extLst>
+          </p:cNvPr>
+          <p:cNvSpPr>
+            <a:spLocks noGrp="1"/>
+          </p:cNvSpPr>
+          <p:nvPr>
+            <p:ph type="title"/>
+          </p:nvPr>
+        </p:nvSpPr>
+        <p:spPr/>
+        <p:txBody>
+          <a:bodyPr/>
+          <a:lstStyle/>
+          <a:p>
+            <a:r>
+              <a:rPr lang="en-US" dirty="0"/>
+              <a:t>Comparison: Timing Efficiency Plots</a:t>
+            </a:r>
+          </a:p>
+        </p:txBody>
+      </p:sp>
+      <p:sp>
+        <p:nvSpPr>
+          <p:cNvPr id="3" name="Content Placeholder 2">
+            <a:extLst>
+              <a:ext uri="{FF2B5EF4-FFF2-40B4-BE49-F238E27FC236}">
+                <a16:creationId xmlns:a16="http://schemas.microsoft.com/office/drawing/2014/main" id="{A2A6B784-C8AE-4EDC-8C73-885C3F319FC2}"/>
+              </a:ext>
+            </a:extLst>
+          </p:cNvPr>
+          <p:cNvSpPr>
+            <a:spLocks noGrp="1"/>
+          </p:cNvSpPr>
+          <p:nvPr>
+            <p:ph idx="1"/>
+          </p:nvPr>
+        </p:nvSpPr>
+        <p:spPr/>
+        <p:txBody>
+          <a:bodyPr/>
+          <a:lstStyle/>
+          <a:p>
+            <a:endParaRPr lang="en-US" dirty="0"/>
+          </a:p>
+        </p:txBody>
+      </p:sp>
+    </p:spTree>
+    <p:extLst>
+      <p:ext uri="{BB962C8B-B14F-4D97-AF65-F5344CB8AC3E}">
+        <p14:creationId xmlns:p14="http://schemas.microsoft.com/office/powerpoint/2010/main" val="3198049024"/>
+      </p:ext>
+    </p:extLst>
+  </p:cSld>
+  <p:clrMapOvr>
+    <a:masterClrMapping/>
+  </p:clrMapOvr>
+</p:sld>
+</file>
+
+<file path=ppt/slides/slide7.xml><?xml version="1.0" encoding="utf-8"?>
+<p:sld xmlns:a="http://schemas.openxmlformats.org/drawingml/2006/main" xmlns:r="http://schemas.openxmlformats.org/officeDocument/2006/relationships" xmlns:p="http://schemas.openxmlformats.org/presentationml/2006/main">
+  <p:cSld>
+    <p:spTree>
+      <p:nvGrpSpPr>
+        <p:cNvPr id="1" name=""/>
+        <p:cNvGrpSpPr/>
+        <p:nvPr/>
+      </p:nvGrpSpPr>
+      <p:grpSpPr>
+        <a:xfrm>
+          <a:off x="0" y="0"/>
+          <a:ext cx="0" cy="0"/>
+          <a:chOff x="0" y="0"/>
+          <a:chExt cx="0" cy="0"/>
+        </a:xfrm>
+      </p:grpSpPr>
+      <p:sp>
+        <p:nvSpPr>
+          <p:cNvPr id="2" name="Title 1">
+            <a:extLst>
+              <a:ext uri="{FF2B5EF4-FFF2-40B4-BE49-F238E27FC236}">
                 <a16:creationId xmlns:a16="http://schemas.microsoft.com/office/drawing/2014/main" id="{F125CC4B-198F-4FEE-BBF8-4D4E7148CAE4}"/>
               </a:ext>
             </a:extLst>
@@ -4250,15 +5849,783 @@
         </p:nvSpPr>
         <p:spPr>
           <a:xfrm>
-            <a:off x="1097280" y="1845734"/>
-            <a:ext cx="2131558" cy="4023360"/>
+            <a:off x="443294" y="3831058"/>
+            <a:ext cx="3128795" cy="2166251"/>
           </a:xfrm>
         </p:spPr>
         <p:txBody>
-          <a:bodyPr/>
+          <a:bodyPr>
+            <a:normAutofit/>
+          </a:bodyPr>
           <a:lstStyle/>
           <a:p>
-            <a:endParaRPr lang="en-US" dirty="0"/>
+            <a:pPr algn="ctr"/>
+            <a:r>
+              <a:rPr lang="en-US" dirty="0">
+                <a:latin typeface="Arial" panose="020B0604020202020204" pitchFamily="34" charset="0"/>
+                <a:cs typeface="Arial" panose="020B0604020202020204" pitchFamily="34" charset="0"/>
+              </a:rPr>
+              <a:t>Joseph Loss</a:t>
+            </a:r>
+          </a:p>
+          <a:p>
+            <a:pPr algn="ctr"/>
+            <a:r>
+              <a:rPr lang="en-US" dirty="0">
+                <a:solidFill>
+                  <a:schemeClr val="accent2"/>
+                </a:solidFill>
+                <a:latin typeface="Arial" panose="020B0604020202020204" pitchFamily="34" charset="0"/>
+                <a:cs typeface="Arial" panose="020B0604020202020204" pitchFamily="34" charset="0"/>
+              </a:rPr>
+              <a:t>loss2@illinois.edu </a:t>
+            </a:r>
+          </a:p>
+          <a:p>
+            <a:pPr algn="ctr"/>
+            <a:r>
+              <a:rPr lang="en-US" dirty="0">
+                <a:latin typeface="Arial" panose="020B0604020202020204" pitchFamily="34" charset="0"/>
+                <a:cs typeface="Arial" panose="020B0604020202020204" pitchFamily="34" charset="0"/>
+              </a:rPr>
+              <a:t>University of Illinois</a:t>
+            </a:r>
+          </a:p>
+          <a:p>
+            <a:pPr algn="ctr"/>
+            <a:r>
+              <a:rPr lang="en-US" dirty="0">
+                <a:latin typeface="Arial" panose="020B0604020202020204" pitchFamily="34" charset="0"/>
+                <a:cs typeface="Arial" panose="020B0604020202020204" pitchFamily="34" charset="0"/>
+              </a:rPr>
+              <a:t>MS Financial Engineering </a:t>
+            </a:r>
+          </a:p>
+        </p:txBody>
+      </p:sp>
+      <p:pic>
+        <p:nvPicPr>
+          <p:cNvPr id="7" name="Picture 6" descr="A person wearing a suit and tie&#10;&#10;Description automatically generated">
+            <a:extLst>
+              <a:ext uri="{FF2B5EF4-FFF2-40B4-BE49-F238E27FC236}">
+                <a16:creationId xmlns:a16="http://schemas.microsoft.com/office/drawing/2014/main" id="{1FA7A8A6-DE19-4FB6-ACFB-79F8CDFBFD61}"/>
+              </a:ext>
+            </a:extLst>
+          </p:cNvPr>
+          <p:cNvPicPr>
+            <a:picLocks noChangeAspect="1"/>
+          </p:cNvPicPr>
+          <p:nvPr/>
+        </p:nvPicPr>
+        <p:blipFill>
+          <a:blip r:embed="rId2"/>
+          <a:stretch>
+            <a:fillRect/>
+          </a:stretch>
+        </p:blipFill>
+        <p:spPr>
+          <a:xfrm>
+            <a:off x="4863643" y="1841469"/>
+            <a:ext cx="1820824" cy="1820824"/>
+          </a:xfrm>
+          <a:prstGeom prst="rect">
+            <a:avLst/>
+          </a:prstGeom>
+        </p:spPr>
+      </p:pic>
+      <p:pic>
+        <p:nvPicPr>
+          <p:cNvPr id="11" name="Picture 10" descr="A person wearing a suit and tie smiling at the camera&#10;&#10;Description automatically generated">
+            <a:extLst>
+              <a:ext uri="{FF2B5EF4-FFF2-40B4-BE49-F238E27FC236}">
+                <a16:creationId xmlns:a16="http://schemas.microsoft.com/office/drawing/2014/main" id="{1F1FF6BB-6A08-4C26-BCDA-0B4BAE6EDE72}"/>
+              </a:ext>
+            </a:extLst>
+          </p:cNvPr>
+          <p:cNvPicPr>
+            <a:picLocks noChangeAspect="1"/>
+          </p:cNvPicPr>
+          <p:nvPr/>
+        </p:nvPicPr>
+        <p:blipFill>
+          <a:blip r:embed="rId3"/>
+          <a:stretch>
+            <a:fillRect/>
+          </a:stretch>
+        </p:blipFill>
+        <p:spPr>
+          <a:xfrm>
+            <a:off x="1097280" y="1841470"/>
+            <a:ext cx="1820824" cy="1820824"/>
+          </a:xfrm>
+          <a:prstGeom prst="rect">
+            <a:avLst/>
+          </a:prstGeom>
+        </p:spPr>
+      </p:pic>
+      <p:sp>
+        <p:nvSpPr>
+          <p:cNvPr id="12" name="Content Placeholder 2">
+            <a:extLst>
+              <a:ext uri="{FF2B5EF4-FFF2-40B4-BE49-F238E27FC236}">
+                <a16:creationId xmlns:a16="http://schemas.microsoft.com/office/drawing/2014/main" id="{D8CF9A3B-890F-41FB-9E67-A275F13E2BF8}"/>
+              </a:ext>
+            </a:extLst>
+          </p:cNvPr>
+          <p:cNvSpPr txBox="1">
+            <a:spLocks/>
+          </p:cNvSpPr>
+          <p:nvPr/>
+        </p:nvSpPr>
+        <p:spPr>
+          <a:xfrm>
+            <a:off x="4209657" y="3831057"/>
+            <a:ext cx="3128795" cy="2166251"/>
+          </a:xfrm>
+          <a:prstGeom prst="rect">
+            <a:avLst/>
+          </a:prstGeom>
+        </p:spPr>
+        <p:txBody>
+          <a:bodyPr vert="horz" lIns="0" tIns="45720" rIns="0" bIns="45720" rtlCol="0">
+            <a:normAutofit/>
+          </a:bodyPr>
+          <a:lstStyle>
+            <a:lvl1pPr marL="91440" indent="-91440" algn="l" defTabSz="914400" rtl="0" eaLnBrk="1" latinLnBrk="0" hangingPunct="1">
+              <a:lnSpc>
+                <a:spcPct val="90000"/>
+              </a:lnSpc>
+              <a:spcBef>
+                <a:spcPts val="1200"/>
+              </a:spcBef>
+              <a:spcAft>
+                <a:spcPts val="200"/>
+              </a:spcAft>
+              <a:buClr>
+                <a:schemeClr val="accent1"/>
+              </a:buClr>
+              <a:buSzPct val="100000"/>
+              <a:buFont typeface="Calibri" panose="020F0502020204030204" pitchFamily="34" charset="0"/>
+              <a:buChar char=" "/>
+              <a:defRPr sz="2000" kern="1200">
+                <a:solidFill>
+                  <a:schemeClr val="tx1">
+                    <a:lumMod val="75000"/>
+                    <a:lumOff val="25000"/>
+                  </a:schemeClr>
+                </a:solidFill>
+                <a:latin typeface="+mn-lt"/>
+                <a:ea typeface="+mn-ea"/>
+                <a:cs typeface="+mn-cs"/>
+              </a:defRPr>
+            </a:lvl1pPr>
+            <a:lvl2pPr marL="384048" indent="-182880" algn="l" defTabSz="914400" rtl="0" eaLnBrk="1" latinLnBrk="0" hangingPunct="1">
+              <a:lnSpc>
+                <a:spcPct val="90000"/>
+              </a:lnSpc>
+              <a:spcBef>
+                <a:spcPts val="200"/>
+              </a:spcBef>
+              <a:spcAft>
+                <a:spcPts val="400"/>
+              </a:spcAft>
+              <a:buClr>
+                <a:schemeClr val="accent1"/>
+              </a:buClr>
+              <a:buFont typeface="Calibri" pitchFamily="34" charset="0"/>
+              <a:buChar char="◦"/>
+              <a:defRPr sz="1800" kern="1200">
+                <a:solidFill>
+                  <a:schemeClr val="tx1">
+                    <a:lumMod val="75000"/>
+                    <a:lumOff val="25000"/>
+                  </a:schemeClr>
+                </a:solidFill>
+                <a:latin typeface="+mn-lt"/>
+                <a:ea typeface="+mn-ea"/>
+                <a:cs typeface="+mn-cs"/>
+              </a:defRPr>
+            </a:lvl2pPr>
+            <a:lvl3pPr marL="566928" indent="-182880" algn="l" defTabSz="914400" rtl="0" eaLnBrk="1" latinLnBrk="0" hangingPunct="1">
+              <a:lnSpc>
+                <a:spcPct val="90000"/>
+              </a:lnSpc>
+              <a:spcBef>
+                <a:spcPts val="200"/>
+              </a:spcBef>
+              <a:spcAft>
+                <a:spcPts val="400"/>
+              </a:spcAft>
+              <a:buClr>
+                <a:schemeClr val="accent1"/>
+              </a:buClr>
+              <a:buFont typeface="Calibri" pitchFamily="34" charset="0"/>
+              <a:buChar char="◦"/>
+              <a:defRPr sz="1400" kern="1200">
+                <a:solidFill>
+                  <a:schemeClr val="tx1">
+                    <a:lumMod val="75000"/>
+                    <a:lumOff val="25000"/>
+                  </a:schemeClr>
+                </a:solidFill>
+                <a:latin typeface="+mn-lt"/>
+                <a:ea typeface="+mn-ea"/>
+                <a:cs typeface="+mn-cs"/>
+              </a:defRPr>
+            </a:lvl3pPr>
+            <a:lvl4pPr marL="749808" indent="-182880" algn="l" defTabSz="914400" rtl="0" eaLnBrk="1" latinLnBrk="0" hangingPunct="1">
+              <a:lnSpc>
+                <a:spcPct val="90000"/>
+              </a:lnSpc>
+              <a:spcBef>
+                <a:spcPts val="200"/>
+              </a:spcBef>
+              <a:spcAft>
+                <a:spcPts val="400"/>
+              </a:spcAft>
+              <a:buClr>
+                <a:schemeClr val="accent1"/>
+              </a:buClr>
+              <a:buFont typeface="Calibri" pitchFamily="34" charset="0"/>
+              <a:buChar char="◦"/>
+              <a:defRPr sz="1400" kern="1200">
+                <a:solidFill>
+                  <a:schemeClr val="tx1">
+                    <a:lumMod val="75000"/>
+                    <a:lumOff val="25000"/>
+                  </a:schemeClr>
+                </a:solidFill>
+                <a:latin typeface="+mn-lt"/>
+                <a:ea typeface="+mn-ea"/>
+                <a:cs typeface="+mn-cs"/>
+              </a:defRPr>
+            </a:lvl4pPr>
+            <a:lvl5pPr marL="932688" indent="-182880" algn="l" defTabSz="914400" rtl="0" eaLnBrk="1" latinLnBrk="0" hangingPunct="1">
+              <a:lnSpc>
+                <a:spcPct val="90000"/>
+              </a:lnSpc>
+              <a:spcBef>
+                <a:spcPts val="200"/>
+              </a:spcBef>
+              <a:spcAft>
+                <a:spcPts val="400"/>
+              </a:spcAft>
+              <a:buClr>
+                <a:schemeClr val="accent1"/>
+              </a:buClr>
+              <a:buFont typeface="Calibri" pitchFamily="34" charset="0"/>
+              <a:buChar char="◦"/>
+              <a:defRPr sz="1400" kern="1200">
+                <a:solidFill>
+                  <a:schemeClr val="tx1">
+                    <a:lumMod val="75000"/>
+                    <a:lumOff val="25000"/>
+                  </a:schemeClr>
+                </a:solidFill>
+                <a:latin typeface="+mn-lt"/>
+                <a:ea typeface="+mn-ea"/>
+                <a:cs typeface="+mn-cs"/>
+              </a:defRPr>
+            </a:lvl5pPr>
+            <a:lvl6pPr marL="1100000" indent="-228600" algn="l" defTabSz="914400" rtl="0" eaLnBrk="1" latinLnBrk="0" hangingPunct="1">
+              <a:lnSpc>
+                <a:spcPct val="90000"/>
+              </a:lnSpc>
+              <a:spcBef>
+                <a:spcPts val="200"/>
+              </a:spcBef>
+              <a:spcAft>
+                <a:spcPts val="400"/>
+              </a:spcAft>
+              <a:buClr>
+                <a:schemeClr val="accent1"/>
+              </a:buClr>
+              <a:buFont typeface="Calibri" pitchFamily="34" charset="0"/>
+              <a:buChar char="◦"/>
+              <a:defRPr sz="1400" kern="1200">
+                <a:solidFill>
+                  <a:schemeClr val="tx1">
+                    <a:lumMod val="75000"/>
+                    <a:lumOff val="25000"/>
+                  </a:schemeClr>
+                </a:solidFill>
+                <a:latin typeface="+mn-lt"/>
+                <a:ea typeface="+mn-ea"/>
+                <a:cs typeface="+mn-cs"/>
+              </a:defRPr>
+            </a:lvl6pPr>
+            <a:lvl7pPr marL="1300000" indent="-228600" algn="l" defTabSz="914400" rtl="0" eaLnBrk="1" latinLnBrk="0" hangingPunct="1">
+              <a:lnSpc>
+                <a:spcPct val="90000"/>
+              </a:lnSpc>
+              <a:spcBef>
+                <a:spcPts val="200"/>
+              </a:spcBef>
+              <a:spcAft>
+                <a:spcPts val="400"/>
+              </a:spcAft>
+              <a:buClr>
+                <a:schemeClr val="accent1"/>
+              </a:buClr>
+              <a:buFont typeface="Calibri" pitchFamily="34" charset="0"/>
+              <a:buChar char="◦"/>
+              <a:defRPr sz="1400" kern="1200">
+                <a:solidFill>
+                  <a:schemeClr val="tx1">
+                    <a:lumMod val="75000"/>
+                    <a:lumOff val="25000"/>
+                  </a:schemeClr>
+                </a:solidFill>
+                <a:latin typeface="+mn-lt"/>
+                <a:ea typeface="+mn-ea"/>
+                <a:cs typeface="+mn-cs"/>
+              </a:defRPr>
+            </a:lvl7pPr>
+            <a:lvl8pPr marL="1500000" indent="-228600" algn="l" defTabSz="914400" rtl="0" eaLnBrk="1" latinLnBrk="0" hangingPunct="1">
+              <a:lnSpc>
+                <a:spcPct val="90000"/>
+              </a:lnSpc>
+              <a:spcBef>
+                <a:spcPts val="200"/>
+              </a:spcBef>
+              <a:spcAft>
+                <a:spcPts val="400"/>
+              </a:spcAft>
+              <a:buClr>
+                <a:schemeClr val="accent1"/>
+              </a:buClr>
+              <a:buFont typeface="Calibri" pitchFamily="34" charset="0"/>
+              <a:buChar char="◦"/>
+              <a:defRPr sz="1400" kern="1200">
+                <a:solidFill>
+                  <a:schemeClr val="tx1">
+                    <a:lumMod val="75000"/>
+                    <a:lumOff val="25000"/>
+                  </a:schemeClr>
+                </a:solidFill>
+                <a:latin typeface="+mn-lt"/>
+                <a:ea typeface="+mn-ea"/>
+                <a:cs typeface="+mn-cs"/>
+              </a:defRPr>
+            </a:lvl8pPr>
+            <a:lvl9pPr marL="1700000" indent="-228600" algn="l" defTabSz="914400" rtl="0" eaLnBrk="1" latinLnBrk="0" hangingPunct="1">
+              <a:lnSpc>
+                <a:spcPct val="90000"/>
+              </a:lnSpc>
+              <a:spcBef>
+                <a:spcPts val="200"/>
+              </a:spcBef>
+              <a:spcAft>
+                <a:spcPts val="400"/>
+              </a:spcAft>
+              <a:buClr>
+                <a:schemeClr val="accent1"/>
+              </a:buClr>
+              <a:buFont typeface="Calibri" pitchFamily="34" charset="0"/>
+              <a:buChar char="◦"/>
+              <a:defRPr sz="1400" kern="1200">
+                <a:solidFill>
+                  <a:schemeClr val="tx1">
+                    <a:lumMod val="75000"/>
+                    <a:lumOff val="25000"/>
+                  </a:schemeClr>
+                </a:solidFill>
+                <a:latin typeface="+mn-lt"/>
+                <a:ea typeface="+mn-ea"/>
+                <a:cs typeface="+mn-cs"/>
+              </a:defRPr>
+            </a:lvl9pPr>
+          </a:lstStyle>
+          <a:p>
+            <a:pPr algn="ctr"/>
+            <a:r>
+              <a:rPr lang="en-US" dirty="0">
+                <a:latin typeface="Arial" panose="020B0604020202020204" pitchFamily="34" charset="0"/>
+                <a:cs typeface="Arial" panose="020B0604020202020204" pitchFamily="34" charset="0"/>
+              </a:rPr>
+              <a:t>Yuchen Duan</a:t>
+            </a:r>
+          </a:p>
+          <a:p>
+            <a:pPr algn="ctr"/>
+            <a:r>
+              <a:rPr lang="en-US" dirty="0">
+                <a:solidFill>
+                  <a:schemeClr val="accent2"/>
+                </a:solidFill>
+                <a:latin typeface="Arial" panose="020B0604020202020204" pitchFamily="34" charset="0"/>
+                <a:cs typeface="Arial" panose="020B0604020202020204" pitchFamily="34" charset="0"/>
+              </a:rPr>
+              <a:t>yuchend3@illinois.edu </a:t>
+            </a:r>
+          </a:p>
+          <a:p>
+            <a:pPr algn="ctr"/>
+            <a:r>
+              <a:rPr lang="en-US" dirty="0">
+                <a:latin typeface="Arial" panose="020B0604020202020204" pitchFamily="34" charset="0"/>
+                <a:cs typeface="Arial" panose="020B0604020202020204" pitchFamily="34" charset="0"/>
+              </a:rPr>
+              <a:t>University of Illinois </a:t>
+            </a:r>
+          </a:p>
+          <a:p>
+            <a:pPr algn="ctr"/>
+            <a:r>
+              <a:rPr lang="en-US" dirty="0">
+                <a:latin typeface="Arial" panose="020B0604020202020204" pitchFamily="34" charset="0"/>
+                <a:cs typeface="Arial" panose="020B0604020202020204" pitchFamily="34" charset="0"/>
+              </a:rPr>
+              <a:t>MS Financial Engineering </a:t>
+            </a:r>
+          </a:p>
+        </p:txBody>
+      </p:sp>
+      <p:pic>
+        <p:nvPicPr>
+          <p:cNvPr id="15" name="Picture 14" descr="A person wearing a suit and tie&#10;&#10;Description automatically generated">
+            <a:extLst>
+              <a:ext uri="{FF2B5EF4-FFF2-40B4-BE49-F238E27FC236}">
+                <a16:creationId xmlns:a16="http://schemas.microsoft.com/office/drawing/2014/main" id="{4B9EB5CB-62CB-4DB4-90EA-7D604CB8D6C4}"/>
+              </a:ext>
+            </a:extLst>
+          </p:cNvPr>
+          <p:cNvPicPr>
+            <a:picLocks noChangeAspect="1"/>
+          </p:cNvPicPr>
+          <p:nvPr/>
+        </p:nvPicPr>
+        <p:blipFill>
+          <a:blip r:embed="rId2"/>
+          <a:stretch>
+            <a:fillRect/>
+          </a:stretch>
+        </p:blipFill>
+        <p:spPr>
+          <a:xfrm>
+            <a:off x="8574597" y="1841469"/>
+            <a:ext cx="1820824" cy="1820824"/>
+          </a:xfrm>
+          <a:prstGeom prst="rect">
+            <a:avLst/>
+          </a:prstGeom>
+        </p:spPr>
+      </p:pic>
+      <p:sp>
+        <p:nvSpPr>
+          <p:cNvPr id="16" name="Content Placeholder 2">
+            <a:extLst>
+              <a:ext uri="{FF2B5EF4-FFF2-40B4-BE49-F238E27FC236}">
+                <a16:creationId xmlns:a16="http://schemas.microsoft.com/office/drawing/2014/main" id="{2F4AA7CC-6D21-45BA-9761-D542B893B95F}"/>
+              </a:ext>
+            </a:extLst>
+          </p:cNvPr>
+          <p:cNvSpPr txBox="1">
+            <a:spLocks/>
+          </p:cNvSpPr>
+          <p:nvPr/>
+        </p:nvSpPr>
+        <p:spPr>
+          <a:xfrm>
+            <a:off x="7920610" y="3831057"/>
+            <a:ext cx="3128795" cy="2166251"/>
+          </a:xfrm>
+          <a:prstGeom prst="rect">
+            <a:avLst/>
+          </a:prstGeom>
+        </p:spPr>
+        <p:txBody>
+          <a:bodyPr vert="horz" lIns="0" tIns="45720" rIns="0" bIns="45720" rtlCol="0">
+            <a:normAutofit/>
+          </a:bodyPr>
+          <a:lstStyle>
+            <a:lvl1pPr marL="91440" indent="-91440" algn="l" defTabSz="914400" rtl="0" eaLnBrk="1" latinLnBrk="0" hangingPunct="1">
+              <a:lnSpc>
+                <a:spcPct val="90000"/>
+              </a:lnSpc>
+              <a:spcBef>
+                <a:spcPts val="1200"/>
+              </a:spcBef>
+              <a:spcAft>
+                <a:spcPts val="200"/>
+              </a:spcAft>
+              <a:buClr>
+                <a:schemeClr val="accent1"/>
+              </a:buClr>
+              <a:buSzPct val="100000"/>
+              <a:buFont typeface="Calibri" panose="020F0502020204030204" pitchFamily="34" charset="0"/>
+              <a:buChar char=" "/>
+              <a:defRPr sz="2000" kern="1200">
+                <a:solidFill>
+                  <a:schemeClr val="tx1">
+                    <a:lumMod val="75000"/>
+                    <a:lumOff val="25000"/>
+                  </a:schemeClr>
+                </a:solidFill>
+                <a:latin typeface="+mn-lt"/>
+                <a:ea typeface="+mn-ea"/>
+                <a:cs typeface="+mn-cs"/>
+              </a:defRPr>
+            </a:lvl1pPr>
+            <a:lvl2pPr marL="384048" indent="-182880" algn="l" defTabSz="914400" rtl="0" eaLnBrk="1" latinLnBrk="0" hangingPunct="1">
+              <a:lnSpc>
+                <a:spcPct val="90000"/>
+              </a:lnSpc>
+              <a:spcBef>
+                <a:spcPts val="200"/>
+              </a:spcBef>
+              <a:spcAft>
+                <a:spcPts val="400"/>
+              </a:spcAft>
+              <a:buClr>
+                <a:schemeClr val="accent1"/>
+              </a:buClr>
+              <a:buFont typeface="Calibri" pitchFamily="34" charset="0"/>
+              <a:buChar char="◦"/>
+              <a:defRPr sz="1800" kern="1200">
+                <a:solidFill>
+                  <a:schemeClr val="tx1">
+                    <a:lumMod val="75000"/>
+                    <a:lumOff val="25000"/>
+                  </a:schemeClr>
+                </a:solidFill>
+                <a:latin typeface="+mn-lt"/>
+                <a:ea typeface="+mn-ea"/>
+                <a:cs typeface="+mn-cs"/>
+              </a:defRPr>
+            </a:lvl2pPr>
+            <a:lvl3pPr marL="566928" indent="-182880" algn="l" defTabSz="914400" rtl="0" eaLnBrk="1" latinLnBrk="0" hangingPunct="1">
+              <a:lnSpc>
+                <a:spcPct val="90000"/>
+              </a:lnSpc>
+              <a:spcBef>
+                <a:spcPts val="200"/>
+              </a:spcBef>
+              <a:spcAft>
+                <a:spcPts val="400"/>
+              </a:spcAft>
+              <a:buClr>
+                <a:schemeClr val="accent1"/>
+              </a:buClr>
+              <a:buFont typeface="Calibri" pitchFamily="34" charset="0"/>
+              <a:buChar char="◦"/>
+              <a:defRPr sz="1400" kern="1200">
+                <a:solidFill>
+                  <a:schemeClr val="tx1">
+                    <a:lumMod val="75000"/>
+                    <a:lumOff val="25000"/>
+                  </a:schemeClr>
+                </a:solidFill>
+                <a:latin typeface="+mn-lt"/>
+                <a:ea typeface="+mn-ea"/>
+                <a:cs typeface="+mn-cs"/>
+              </a:defRPr>
+            </a:lvl3pPr>
+            <a:lvl4pPr marL="749808" indent="-182880" algn="l" defTabSz="914400" rtl="0" eaLnBrk="1" latinLnBrk="0" hangingPunct="1">
+              <a:lnSpc>
+                <a:spcPct val="90000"/>
+              </a:lnSpc>
+              <a:spcBef>
+                <a:spcPts val="200"/>
+              </a:spcBef>
+              <a:spcAft>
+                <a:spcPts val="400"/>
+              </a:spcAft>
+              <a:buClr>
+                <a:schemeClr val="accent1"/>
+              </a:buClr>
+              <a:buFont typeface="Calibri" pitchFamily="34" charset="0"/>
+              <a:buChar char="◦"/>
+              <a:defRPr sz="1400" kern="1200">
+                <a:solidFill>
+                  <a:schemeClr val="tx1">
+                    <a:lumMod val="75000"/>
+                    <a:lumOff val="25000"/>
+                  </a:schemeClr>
+                </a:solidFill>
+                <a:latin typeface="+mn-lt"/>
+                <a:ea typeface="+mn-ea"/>
+                <a:cs typeface="+mn-cs"/>
+              </a:defRPr>
+            </a:lvl4pPr>
+            <a:lvl5pPr marL="932688" indent="-182880" algn="l" defTabSz="914400" rtl="0" eaLnBrk="1" latinLnBrk="0" hangingPunct="1">
+              <a:lnSpc>
+                <a:spcPct val="90000"/>
+              </a:lnSpc>
+              <a:spcBef>
+                <a:spcPts val="200"/>
+              </a:spcBef>
+              <a:spcAft>
+                <a:spcPts val="400"/>
+              </a:spcAft>
+              <a:buClr>
+                <a:schemeClr val="accent1"/>
+              </a:buClr>
+              <a:buFont typeface="Calibri" pitchFamily="34" charset="0"/>
+              <a:buChar char="◦"/>
+              <a:defRPr sz="1400" kern="1200">
+                <a:solidFill>
+                  <a:schemeClr val="tx1">
+                    <a:lumMod val="75000"/>
+                    <a:lumOff val="25000"/>
+                  </a:schemeClr>
+                </a:solidFill>
+                <a:latin typeface="+mn-lt"/>
+                <a:ea typeface="+mn-ea"/>
+                <a:cs typeface="+mn-cs"/>
+              </a:defRPr>
+            </a:lvl5pPr>
+            <a:lvl6pPr marL="1100000" indent="-228600" algn="l" defTabSz="914400" rtl="0" eaLnBrk="1" latinLnBrk="0" hangingPunct="1">
+              <a:lnSpc>
+                <a:spcPct val="90000"/>
+              </a:lnSpc>
+              <a:spcBef>
+                <a:spcPts val="200"/>
+              </a:spcBef>
+              <a:spcAft>
+                <a:spcPts val="400"/>
+              </a:spcAft>
+              <a:buClr>
+                <a:schemeClr val="accent1"/>
+              </a:buClr>
+              <a:buFont typeface="Calibri" pitchFamily="34" charset="0"/>
+              <a:buChar char="◦"/>
+              <a:defRPr sz="1400" kern="1200">
+                <a:solidFill>
+                  <a:schemeClr val="tx1">
+                    <a:lumMod val="75000"/>
+                    <a:lumOff val="25000"/>
+                  </a:schemeClr>
+                </a:solidFill>
+                <a:latin typeface="+mn-lt"/>
+                <a:ea typeface="+mn-ea"/>
+                <a:cs typeface="+mn-cs"/>
+              </a:defRPr>
+            </a:lvl6pPr>
+            <a:lvl7pPr marL="1300000" indent="-228600" algn="l" defTabSz="914400" rtl="0" eaLnBrk="1" latinLnBrk="0" hangingPunct="1">
+              <a:lnSpc>
+                <a:spcPct val="90000"/>
+              </a:lnSpc>
+              <a:spcBef>
+                <a:spcPts val="200"/>
+              </a:spcBef>
+              <a:spcAft>
+                <a:spcPts val="400"/>
+              </a:spcAft>
+              <a:buClr>
+                <a:schemeClr val="accent1"/>
+              </a:buClr>
+              <a:buFont typeface="Calibri" pitchFamily="34" charset="0"/>
+              <a:buChar char="◦"/>
+              <a:defRPr sz="1400" kern="1200">
+                <a:solidFill>
+                  <a:schemeClr val="tx1">
+                    <a:lumMod val="75000"/>
+                    <a:lumOff val="25000"/>
+                  </a:schemeClr>
+                </a:solidFill>
+                <a:latin typeface="+mn-lt"/>
+                <a:ea typeface="+mn-ea"/>
+                <a:cs typeface="+mn-cs"/>
+              </a:defRPr>
+            </a:lvl7pPr>
+            <a:lvl8pPr marL="1500000" indent="-228600" algn="l" defTabSz="914400" rtl="0" eaLnBrk="1" latinLnBrk="0" hangingPunct="1">
+              <a:lnSpc>
+                <a:spcPct val="90000"/>
+              </a:lnSpc>
+              <a:spcBef>
+                <a:spcPts val="200"/>
+              </a:spcBef>
+              <a:spcAft>
+                <a:spcPts val="400"/>
+              </a:spcAft>
+              <a:buClr>
+                <a:schemeClr val="accent1"/>
+              </a:buClr>
+              <a:buFont typeface="Calibri" pitchFamily="34" charset="0"/>
+              <a:buChar char="◦"/>
+              <a:defRPr sz="1400" kern="1200">
+                <a:solidFill>
+                  <a:schemeClr val="tx1">
+                    <a:lumMod val="75000"/>
+                    <a:lumOff val="25000"/>
+                  </a:schemeClr>
+                </a:solidFill>
+                <a:latin typeface="+mn-lt"/>
+                <a:ea typeface="+mn-ea"/>
+                <a:cs typeface="+mn-cs"/>
+              </a:defRPr>
+            </a:lvl8pPr>
+            <a:lvl9pPr marL="1700000" indent="-228600" algn="l" defTabSz="914400" rtl="0" eaLnBrk="1" latinLnBrk="0" hangingPunct="1">
+              <a:lnSpc>
+                <a:spcPct val="90000"/>
+              </a:lnSpc>
+              <a:spcBef>
+                <a:spcPts val="200"/>
+              </a:spcBef>
+              <a:spcAft>
+                <a:spcPts val="400"/>
+              </a:spcAft>
+              <a:buClr>
+                <a:schemeClr val="accent1"/>
+              </a:buClr>
+              <a:buFont typeface="Calibri" pitchFamily="34" charset="0"/>
+              <a:buChar char="◦"/>
+              <a:defRPr sz="1400" kern="1200">
+                <a:solidFill>
+                  <a:schemeClr val="tx1">
+                    <a:lumMod val="75000"/>
+                    <a:lumOff val="25000"/>
+                  </a:schemeClr>
+                </a:solidFill>
+                <a:latin typeface="+mn-lt"/>
+                <a:ea typeface="+mn-ea"/>
+                <a:cs typeface="+mn-cs"/>
+              </a:defRPr>
+            </a:lvl9pPr>
+          </a:lstStyle>
+          <a:p>
+            <a:pPr algn="ctr"/>
+            <a:r>
+              <a:rPr lang="en-US" dirty="0">
+                <a:latin typeface="Arial" panose="020B0604020202020204" pitchFamily="34" charset="0"/>
+                <a:cs typeface="Arial" panose="020B0604020202020204" pitchFamily="34" charset="0"/>
+              </a:rPr>
+              <a:t>Daniel Liberman</a:t>
+            </a:r>
+          </a:p>
+          <a:p>
+            <a:pPr algn="ctr"/>
+            <a:r>
+              <a:rPr lang="en-US" dirty="0">
+                <a:solidFill>
+                  <a:schemeClr val="accent2"/>
+                </a:solidFill>
+                <a:latin typeface="Arial" panose="020B0604020202020204" pitchFamily="34" charset="0"/>
+                <a:cs typeface="Arial" panose="020B0604020202020204" pitchFamily="34" charset="0"/>
+              </a:rPr>
+              <a:t>danliber92@gmail.com</a:t>
+            </a:r>
+          </a:p>
+          <a:p>
+            <a:pPr algn="ctr"/>
+            <a:r>
+              <a:rPr lang="en-US" dirty="0">
+                <a:latin typeface="Arial" panose="020B0604020202020204" pitchFamily="34" charset="0"/>
+                <a:cs typeface="Arial" panose="020B0604020202020204" pitchFamily="34" charset="0"/>
+              </a:rPr>
+              <a:t>University of Illinois</a:t>
+            </a:r>
+          </a:p>
+          <a:p>
+            <a:pPr algn="ctr"/>
+            <a:r>
+              <a:rPr lang="en-US" dirty="0">
+                <a:latin typeface="Arial" panose="020B0604020202020204" pitchFamily="34" charset="0"/>
+                <a:cs typeface="Arial" panose="020B0604020202020204" pitchFamily="34" charset="0"/>
+              </a:rPr>
+              <a:t>BS Finance</a:t>
+            </a:r>
           </a:p>
         </p:txBody>
       </p:sp>

</xml_diff>